<commit_message>
Correction for Vauban training
</commit_message>
<xml_diff>
--- a/exo-developer/440-chrommatic/slides/440-Chromattic-XDev-en.pptx
+++ b/exo-developer/440-chrommatic/slides/440-Chromattic-XDev-en.pptx
@@ -7,7 +7,7 @@
     <p:sldMasterId id="2147483803" r:id="rId3"/>
   </p:sldMasterIdLst>
   <p:notesMasterIdLst>
-    <p:notesMasterId r:id="rId37"/>
+    <p:notesMasterId r:id="rId35"/>
   </p:notesMasterIdLst>
   <p:sldIdLst>
     <p:sldId id="256" r:id="rId4"/>
@@ -40,9 +40,7 @@
     <p:sldId id="279" r:id="rId31"/>
     <p:sldId id="280" r:id="rId32"/>
     <p:sldId id="282" r:id="rId33"/>
-    <p:sldId id="299" r:id="rId34"/>
-    <p:sldId id="297" r:id="rId35"/>
-    <p:sldId id="278" r:id="rId36"/>
+    <p:sldId id="278" r:id="rId34"/>
   </p:sldIdLst>
   <p:sldSz cx="11160125" cy="7559675"/>
   <p:notesSz cx="7772400" cy="10058400"/>
@@ -723,7 +721,7 @@
             <a:fld id="{50272E71-F12A-4750-B2CE-2B5D93B0A555}" type="slidenum">
               <a:rPr lang="en-GB"/>
               <a:pPr/>
-              <a:t>‹nº›</a:t>
+              <a:t>‹#›</a:t>
             </a:fld>
             <a:endParaRPr lang="en-GB"/>
           </a:p>
@@ -4678,251 +4676,6 @@
       </p:grpSpPr>
       <p:sp>
         <p:nvSpPr>
-          <p:cNvPr id="82946" name="Rectangle 11"/>
-          <p:cNvSpPr>
-            <a:spLocks noGrp="1" noChangeArrowheads="1"/>
-          </p:cNvSpPr>
-          <p:nvPr>
-            <p:ph type="sldNum" sz="quarter"/>
-          </p:nvPr>
-        </p:nvSpPr>
-        <p:spPr>
-          <a:noFill/>
-        </p:spPr>
-        <p:txBody>
-          <a:bodyPr/>
-          <a:lstStyle/>
-          <a:p>
-            <a:fld id="{DAD17F86-E20E-4F41-A533-188B086D09F0}" type="slidenum">
-              <a:rPr lang="en-GB">
-                <a:solidFill>
-                  <a:prstClr val="white"/>
-                </a:solidFill>
-              </a:rPr>
-              <a:pPr/>
-              <a:t>31</a:t>
-            </a:fld>
-            <a:endParaRPr lang="en-GB">
-              <a:solidFill>
-                <a:prstClr val="white"/>
-              </a:solidFill>
-            </a:endParaRPr>
-          </a:p>
-        </p:txBody>
-      </p:sp>
-      <p:sp>
-        <p:nvSpPr>
-          <p:cNvPr id="82947" name="Text Box 1"/>
-          <p:cNvSpPr txBox="1">
-            <a:spLocks noChangeArrowheads="1"/>
-          </p:cNvSpPr>
-          <p:nvPr/>
-        </p:nvSpPr>
-        <p:spPr bwMode="auto">
-          <a:xfrm>
-            <a:off x="4398963" y="9555163"/>
-            <a:ext cx="3371850" cy="501650"/>
-          </a:xfrm>
-          <a:prstGeom prst="rect">
-            <a:avLst/>
-          </a:prstGeom>
-          <a:noFill/>
-          <a:ln w="9525">
-            <a:noFill/>
-            <a:round/>
-            <a:headEnd/>
-            <a:tailEnd/>
-          </a:ln>
-        </p:spPr>
-        <p:txBody>
-          <a:bodyPr lIns="0" tIns="0" rIns="0" bIns="0" anchor="b"/>
-          <a:lstStyle/>
-          <a:p>
-            <a:pPr algn="r">
-              <a:lnSpc>
-                <a:spcPct val="98000"/>
-              </a:lnSpc>
-              <a:buFont typeface="Wingdings" charset="2"/>
-              <a:buNone/>
-              <a:tabLst>
-                <a:tab pos="0" algn="l"/>
-                <a:tab pos="457200" algn="l"/>
-                <a:tab pos="914400" algn="l"/>
-                <a:tab pos="1371600" algn="l"/>
-                <a:tab pos="1828800" algn="l"/>
-                <a:tab pos="2286000" algn="l"/>
-                <a:tab pos="2743200" algn="l"/>
-                <a:tab pos="3200400" algn="l"/>
-                <a:tab pos="3657600" algn="l"/>
-                <a:tab pos="4114800" algn="l"/>
-                <a:tab pos="4572000" algn="l"/>
-                <a:tab pos="5029200" algn="l"/>
-                <a:tab pos="5486400" algn="l"/>
-                <a:tab pos="5943600" algn="l"/>
-                <a:tab pos="6400800" algn="l"/>
-                <a:tab pos="6858000" algn="l"/>
-                <a:tab pos="7315200" algn="l"/>
-                <a:tab pos="7772400" algn="l"/>
-                <a:tab pos="8229600" algn="l"/>
-                <a:tab pos="8686800" algn="l"/>
-                <a:tab pos="9144000" algn="l"/>
-              </a:tabLst>
-            </a:pPr>
-            <a:fld id="{AB97FAAD-E668-46C1-B08E-268D475C1172}" type="slidenum">
-              <a:rPr lang="en-GB" sz="1400">
-                <a:solidFill>
-                  <a:srgbClr val="000000"/>
-                </a:solidFill>
-                <a:latin typeface="Times New Roman" pitchFamily="18" charset="0"/>
-                <a:ea typeface="Arial Unicode MS" pitchFamily="34" charset="-128"/>
-                <a:cs typeface="Arial Unicode MS" pitchFamily="34" charset="-128"/>
-              </a:rPr>
-              <a:pPr algn="r">
-                <a:lnSpc>
-                  <a:spcPct val="98000"/>
-                </a:lnSpc>
-                <a:buFont typeface="Wingdings" charset="2"/>
-                <a:buNone/>
-                <a:tabLst>
-                  <a:tab pos="0" algn="l"/>
-                  <a:tab pos="457200" algn="l"/>
-                  <a:tab pos="914400" algn="l"/>
-                  <a:tab pos="1371600" algn="l"/>
-                  <a:tab pos="1828800" algn="l"/>
-                  <a:tab pos="2286000" algn="l"/>
-                  <a:tab pos="2743200" algn="l"/>
-                  <a:tab pos="3200400" algn="l"/>
-                  <a:tab pos="3657600" algn="l"/>
-                  <a:tab pos="4114800" algn="l"/>
-                  <a:tab pos="4572000" algn="l"/>
-                  <a:tab pos="5029200" algn="l"/>
-                  <a:tab pos="5486400" algn="l"/>
-                  <a:tab pos="5943600" algn="l"/>
-                  <a:tab pos="6400800" algn="l"/>
-                  <a:tab pos="6858000" algn="l"/>
-                  <a:tab pos="7315200" algn="l"/>
-                  <a:tab pos="7772400" algn="l"/>
-                  <a:tab pos="8229600" algn="l"/>
-                  <a:tab pos="8686800" algn="l"/>
-                  <a:tab pos="9144000" algn="l"/>
-                </a:tabLst>
-              </a:pPr>
-              <a:t>31</a:t>
-            </a:fld>
-            <a:endParaRPr lang="en-GB" sz="1400">
-              <a:solidFill>
-                <a:srgbClr val="000000"/>
-              </a:solidFill>
-              <a:latin typeface="Times New Roman" pitchFamily="18" charset="0"/>
-              <a:ea typeface="Arial Unicode MS" pitchFamily="34" charset="-128"/>
-              <a:cs typeface="Arial Unicode MS" pitchFamily="34" charset="-128"/>
-            </a:endParaRPr>
-          </a:p>
-        </p:txBody>
-      </p:sp>
-      <p:sp>
-        <p:nvSpPr>
-          <p:cNvPr id="82948" name="Text Box 2"/>
-          <p:cNvSpPr txBox="1">
-            <a:spLocks noChangeArrowheads="1"/>
-          </p:cNvSpPr>
-          <p:nvPr/>
-        </p:nvSpPr>
-        <p:spPr bwMode="auto">
-          <a:xfrm>
-            <a:off x="1101725" y="763588"/>
-            <a:ext cx="5567363" cy="3771900"/>
-          </a:xfrm>
-          <a:prstGeom prst="rect">
-            <a:avLst/>
-          </a:prstGeom>
-          <a:solidFill>
-            <a:srgbClr val="FFFFFF"/>
-          </a:solidFill>
-          <a:ln w="9360">
-            <a:solidFill>
-              <a:srgbClr val="000000"/>
-            </a:solidFill>
-            <a:miter lim="800000"/>
-            <a:headEnd/>
-            <a:tailEnd/>
-          </a:ln>
-        </p:spPr>
-        <p:txBody>
-          <a:bodyPr wrap="none" anchor="ctr"/>
-          <a:lstStyle/>
-          <a:p>
-            <a:endParaRPr lang="en-US">
-              <a:solidFill>
-                <a:prstClr val="white"/>
-              </a:solidFill>
-            </a:endParaRPr>
-          </a:p>
-        </p:txBody>
-      </p:sp>
-      <p:sp>
-        <p:nvSpPr>
-          <p:cNvPr id="82949" name="Text Box 3"/>
-          <p:cNvSpPr>
-            <a:spLocks noGrp="1" noChangeArrowheads="1"/>
-          </p:cNvSpPr>
-          <p:nvPr>
-            <p:ph type="body"/>
-          </p:nvPr>
-        </p:nvSpPr>
-        <p:spPr>
-          <a:xfrm>
-            <a:off x="777875" y="4776788"/>
-            <a:ext cx="6210300" cy="4519612"/>
-          </a:xfrm>
-          <a:noFill/>
-          <a:ln/>
-        </p:spPr>
-        <p:txBody>
-          <a:bodyPr wrap="none" anchor="ctr"/>
-          <a:lstStyle/>
-          <a:p>
-            <a:endParaRPr lang="en-US" smtClean="0">
-              <a:latin typeface="Times New Roman" pitchFamily="18" charset="0"/>
-            </a:endParaRPr>
-          </a:p>
-        </p:txBody>
-      </p:sp>
-    </p:spTree>
-  </p:cSld>
-  <p:clrMapOvr>
-    <a:masterClrMapping/>
-  </p:clrMapOvr>
-</p:notes>
-</file>
-
-<file path=ppt/notesSlides/notesSlide25.xml><?xml version="1.0" encoding="utf-8"?>
-<p:notes xmlns:a="http://schemas.openxmlformats.org/drawingml/2006/main" xmlns:r="http://schemas.openxmlformats.org/officeDocument/2006/relationships" xmlns:p="http://schemas.openxmlformats.org/presentationml/2006/main">
-  <p:cSld>
-    <p:bg>
-      <p:bgPr>
-        <a:solidFill>
-          <a:srgbClr val="FFFFFF"/>
-        </a:solidFill>
-        <a:effectLst/>
-      </p:bgPr>
-    </p:bg>
-    <p:spTree>
-      <p:nvGrpSpPr>
-        <p:cNvPr id="1" name=""/>
-        <p:cNvGrpSpPr/>
-        <p:nvPr/>
-      </p:nvGrpSpPr>
-      <p:grpSpPr>
-        <a:xfrm>
-          <a:off x="0" y="0"/>
-          <a:ext cx="0" cy="0"/>
-          <a:chOff x="0" y="0"/>
-          <a:chExt cx="0" cy="0"/>
-        </a:xfrm>
-      </p:grpSpPr>
-      <p:sp>
-        <p:nvSpPr>
           <p:cNvPr id="76802" name="Rectangle 11"/>
           <p:cNvSpPr>
             <a:spLocks noGrp="1" noChangeArrowheads="1"/>
@@ -4941,7 +4694,7 @@
             <a:fld id="{5A583EE1-890E-4299-9C98-D3BD4B2D7526}" type="slidenum">
               <a:rPr lang="en-GB"/>
               <a:pPr/>
-              <a:t>33</a:t>
+              <a:t>31</a:t>
             </a:fld>
             <a:endParaRPr lang="en-GB"/>
           </a:p>
@@ -5044,7 +4797,7 @@
                   <a:tab pos="9144000" algn="l"/>
                 </a:tabLst>
               </a:pPr>
-              <a:t>33</a:t>
+              <a:t>31</a:t>
             </a:fld>
             <a:endParaRPr lang="en-GB" sz="1400">
               <a:solidFill>
@@ -7017,7 +6770,7 @@
                   <a:tab pos="9144000" algn="l"/>
                 </a:tabLst>
               </a:pPr>
-              <a:t>‹nº›</a:t>
+              <a:t>‹#›</a:t>
             </a:fld>
             <a:endParaRPr lang="en-GB" sz="1400">
               <a:solidFill>
@@ -7313,7 +7066,7 @@
   <p:clrMapOvr>
     <a:masterClrMapping/>
   </p:clrMapOvr>
-  <p:transition/>
+  <p:transition xmlns:p14="http://schemas.microsoft.com/office/powerpoint/2010/main"/>
 </p:sldLayout>
 </file>
 
@@ -7432,7 +7185,7 @@
                   <a:tab pos="9144000" algn="l"/>
                 </a:tabLst>
               </a:pPr>
-              <a:t>‹nº›</a:t>
+              <a:t>‹#›</a:t>
             </a:fld>
             <a:endParaRPr lang="en-GB" sz="1400">
               <a:solidFill>
@@ -7900,7 +7653,7 @@
                   <a:tab pos="9144000" algn="l"/>
                 </a:tabLst>
               </a:pPr>
-              <a:t>‹nº›</a:t>
+              <a:t>‹#›</a:t>
             </a:fld>
             <a:endParaRPr lang="en-GB" sz="1400">
               <a:solidFill>
@@ -8059,7 +7812,7 @@
                   <a:tab pos="9144000" algn="l"/>
                 </a:tabLst>
               </a:pPr>
-              <a:t>‹nº›</a:t>
+              <a:t>‹#›</a:t>
             </a:fld>
             <a:endParaRPr lang="en-GB" sz="1400">
               <a:solidFill>
@@ -8195,7 +7948,7 @@
                   <a:tab pos="9144000" algn="l"/>
                 </a:tabLst>
               </a:pPr>
-              <a:t>‹nº›</a:t>
+              <a:t>‹#›</a:t>
             </a:fld>
             <a:endParaRPr lang="en-GB" sz="1400">
               <a:solidFill>
@@ -8513,7 +8266,7 @@
                   <a:tab pos="9144000" algn="l"/>
                 </a:tabLst>
               </a:pPr>
-              <a:t>‹nº›</a:t>
+              <a:t>‹#›</a:t>
             </a:fld>
             <a:endParaRPr lang="en-GB" sz="1400">
               <a:solidFill>
@@ -8811,7 +8564,7 @@
                   <a:tab pos="9144000" algn="l"/>
                 </a:tabLst>
               </a:pPr>
-              <a:t>‹nº›</a:t>
+              <a:t>‹#›</a:t>
             </a:fld>
             <a:endParaRPr lang="en-GB" sz="1400">
               <a:solidFill>
@@ -9022,7 +8775,7 @@
                   <a:tab pos="9144000" algn="l"/>
                 </a:tabLst>
               </a:pPr>
-              <a:t>‹nº›</a:t>
+              <a:t>‹#›</a:t>
             </a:fld>
             <a:endParaRPr lang="en-GB" sz="1400">
               <a:solidFill>
@@ -9461,7 +9214,7 @@
                   <a:tab pos="9144000" algn="l"/>
                 </a:tabLst>
               </a:pPr>
-              <a:t>‹nº›</a:t>
+              <a:t>‹#›</a:t>
             </a:fld>
             <a:endParaRPr lang="en-GB" sz="1400">
               <a:solidFill>
@@ -10112,7 +9865,7 @@
   <p:clrMapOvr>
     <a:masterClrMapping/>
   </p:clrMapOvr>
-  <p:transition/>
+  <p:transition xmlns:p14="http://schemas.microsoft.com/office/powerpoint/2010/main"/>
 </p:sldLayout>
 </file>
 
@@ -10501,7 +10254,7 @@
   <p:clrMapOvr>
     <a:masterClrMapping/>
   </p:clrMapOvr>
-  <p:transition/>
+  <p:transition xmlns:p14="http://schemas.microsoft.com/office/powerpoint/2010/main"/>
 </p:sldLayout>
 </file>
 
@@ -10805,7 +10558,7 @@
   <p:clrMapOvr>
     <a:masterClrMapping/>
   </p:clrMapOvr>
-  <p:transition/>
+  <p:transition xmlns:p14="http://schemas.microsoft.com/office/powerpoint/2010/main"/>
 </p:sldLayout>
 </file>
 
@@ -11109,7 +10862,7 @@
   <p:clrMapOvr>
     <a:masterClrMapping/>
   </p:clrMapOvr>
-  <p:transition/>
+  <p:transition xmlns:p14="http://schemas.microsoft.com/office/powerpoint/2010/main"/>
 </p:sldLayout>
 </file>
 
@@ -11413,7 +11166,7 @@
   <p:clrMapOvr>
     <a:masterClrMapping/>
   </p:clrMapOvr>
-  <p:transition/>
+  <p:transition xmlns:p14="http://schemas.microsoft.com/office/powerpoint/2010/main"/>
 </p:sldLayout>
 </file>
 
@@ -11717,7 +11470,7 @@
   <p:clrMapOvr>
     <a:masterClrMapping/>
   </p:clrMapOvr>
-  <p:transition/>
+  <p:transition xmlns:p14="http://schemas.microsoft.com/office/powerpoint/2010/main"/>
 </p:sldLayout>
 </file>
 
@@ -13112,7 +12865,7 @@
                   <a:tab pos="9144000" algn="l"/>
                 </a:tabLst>
               </a:pPr>
-              <a:t>‹nº›</a:t>
+              <a:t>‹#›</a:t>
             </a:fld>
             <a:endParaRPr lang="en-GB" sz="1400">
               <a:solidFill>
@@ -13455,7 +13208,7 @@
                   <a:tab pos="9144000" algn="l"/>
                 </a:tabLst>
               </a:pPr>
-              <a:t>‹nº›</a:t>
+              <a:t>‹#›</a:t>
             </a:fld>
             <a:endParaRPr lang="en-GB" sz="1400">
               <a:solidFill>
@@ -13789,7 +13542,7 @@
                   <a:tab pos="9144000" algn="l"/>
                 </a:tabLst>
               </a:pPr>
-              <a:t>‹nº›</a:t>
+              <a:t>‹#›</a:t>
             </a:fld>
             <a:endParaRPr lang="en-GB" sz="1400">
               <a:solidFill>
@@ -14005,7 +13758,7 @@
   <p:clrMapOvr>
     <a:masterClrMapping/>
   </p:clrMapOvr>
-  <p:transition/>
+  <p:transition xmlns:p14="http://schemas.microsoft.com/office/powerpoint/2010/main"/>
 </p:sldLayout>
 </file>
 
@@ -14124,7 +13877,7 @@
                   <a:tab pos="9144000" algn="l"/>
                 </a:tabLst>
               </a:pPr>
-              <a:t>‹nº›</a:t>
+              <a:t>‹#›</a:t>
             </a:fld>
             <a:endParaRPr lang="en-GB" sz="1400">
               <a:solidFill>
@@ -14453,7 +14206,7 @@
                   <a:tab pos="9144000" algn="l"/>
                 </a:tabLst>
               </a:pPr>
-              <a:t>‹nº›</a:t>
+              <a:t>‹#›</a:t>
             </a:fld>
             <a:endParaRPr lang="en-GB" sz="1400">
               <a:solidFill>
@@ -14839,7 +14592,7 @@
   <p:clrMapOvr>
     <a:masterClrMapping/>
   </p:clrMapOvr>
-  <p:transition/>
+  <p:transition xmlns:p14="http://schemas.microsoft.com/office/powerpoint/2010/main"/>
 </p:sldLayout>
 </file>
 
@@ -14958,7 +14711,7 @@
                   <a:tab pos="9144000" algn="l"/>
                 </a:tabLst>
               </a:pPr>
-              <a:t>‹nº›</a:t>
+              <a:t>‹#›</a:t>
             </a:fld>
             <a:endParaRPr lang="en-GB" sz="1400">
               <a:solidFill>
@@ -15259,7 +15012,7 @@
   <p:clrMapOvr>
     <a:masterClrMapping/>
   </p:clrMapOvr>
-  <p:transition/>
+  <p:transition xmlns:p14="http://schemas.microsoft.com/office/powerpoint/2010/main"/>
 </p:sldLayout>
 </file>
 
@@ -15378,7 +15131,7 @@
                   <a:tab pos="9144000" algn="l"/>
                 </a:tabLst>
               </a:pPr>
-              <a:t>‹nº›</a:t>
+              <a:t>‹#›</a:t>
             </a:fld>
             <a:endParaRPr lang="en-GB" sz="1400">
               <a:solidFill>
@@ -15679,7 +15432,7 @@
   <p:clrMapOvr>
     <a:masterClrMapping/>
   </p:clrMapOvr>
-  <p:transition/>
+  <p:transition xmlns:p14="http://schemas.microsoft.com/office/powerpoint/2010/main"/>
 </p:sldLayout>
 </file>
 
@@ -15798,7 +15551,7 @@
                   <a:tab pos="9144000" algn="l"/>
                 </a:tabLst>
               </a:pPr>
-              <a:t>‹nº›</a:t>
+              <a:t>‹#›</a:t>
             </a:fld>
             <a:endParaRPr lang="en-GB" sz="1400">
               <a:solidFill>
@@ -16099,7 +15852,7 @@
   <p:clrMapOvr>
     <a:masterClrMapping/>
   </p:clrMapOvr>
-  <p:transition/>
+  <p:transition xmlns:p14="http://schemas.microsoft.com/office/powerpoint/2010/main"/>
 </p:sldLayout>
 </file>
 
@@ -16218,7 +15971,7 @@
                   <a:tab pos="9144000" algn="l"/>
                 </a:tabLst>
               </a:pPr>
-              <a:t>‹nº›</a:t>
+              <a:t>‹#›</a:t>
             </a:fld>
             <a:endParaRPr lang="en-GB" sz="1400">
               <a:solidFill>
@@ -16519,7 +16272,7 @@
   <p:clrMapOvr>
     <a:masterClrMapping/>
   </p:clrMapOvr>
-  <p:transition/>
+  <p:transition xmlns:p14="http://schemas.microsoft.com/office/powerpoint/2010/main"/>
 </p:sldLayout>
 </file>
 
@@ -16638,7 +16391,7 @@
                   <a:tab pos="9144000" algn="l"/>
                 </a:tabLst>
               </a:pPr>
-              <a:t>‹nº›</a:t>
+              <a:t>‹#›</a:t>
             </a:fld>
             <a:endParaRPr lang="en-GB" sz="1400">
               <a:solidFill>
@@ -17111,7 +16864,7 @@
                   <a:tab pos="9144000" algn="l"/>
                 </a:tabLst>
               </a:pPr>
-              <a:t>‹nº›</a:t>
+              <a:t>‹#›</a:t>
             </a:fld>
             <a:endParaRPr lang="en-GB" sz="1400">
               <a:solidFill>
@@ -17275,7 +17028,7 @@
                   <a:tab pos="9144000" algn="l"/>
                 </a:tabLst>
               </a:pPr>
-              <a:t>‹nº›</a:t>
+              <a:t>‹#›</a:t>
             </a:fld>
             <a:endParaRPr lang="en-GB" sz="1400">
               <a:solidFill>
@@ -17416,7 +17169,7 @@
                   <a:tab pos="9144000" algn="l"/>
                 </a:tabLst>
               </a:pPr>
-              <a:t>‹nº›</a:t>
+              <a:t>‹#›</a:t>
             </a:fld>
             <a:endParaRPr lang="en-GB" sz="1400">
               <a:solidFill>
@@ -17739,7 +17492,7 @@
                   <a:tab pos="9144000" algn="l"/>
                 </a:tabLst>
               </a:pPr>
-              <a:t>‹nº›</a:t>
+              <a:t>‹#›</a:t>
             </a:fld>
             <a:endParaRPr lang="en-GB" sz="1400">
               <a:solidFill>
@@ -18039,7 +17792,7 @@
                   <a:tab pos="9144000" algn="l"/>
                 </a:tabLst>
               </a:pPr>
-              <a:t>‹nº›</a:t>
+              <a:t>‹#›</a:t>
             </a:fld>
             <a:endParaRPr lang="en-GB" sz="1400">
               <a:solidFill>
@@ -18250,7 +18003,7 @@
   <p:clrMapOvr>
     <a:masterClrMapping/>
   </p:clrMapOvr>
-  <p:transition/>
+  <p:transition xmlns:p14="http://schemas.microsoft.com/office/powerpoint/2010/main"/>
 </p:sldLayout>
 </file>
 
@@ -18369,7 +18122,7 @@
                   <a:tab pos="9144000" algn="l"/>
                 </a:tabLst>
               </a:pPr>
-              <a:t>‹nº›</a:t>
+              <a:t>‹#›</a:t>
             </a:fld>
             <a:endParaRPr lang="en-GB" sz="1400">
               <a:solidFill>
@@ -18585,7 +18338,7 @@
                   <a:tab pos="9144000" algn="l"/>
                 </a:tabLst>
               </a:pPr>
-              <a:t>‹nº›</a:t>
+              <a:t>‹#›</a:t>
             </a:fld>
             <a:endParaRPr lang="en-GB" sz="1400">
               <a:solidFill>
@@ -18811,7 +18564,7 @@
                   <a:tab pos="9144000" algn="l"/>
                 </a:tabLst>
               </a:pPr>
-              <a:t>‹nº›</a:t>
+              <a:t>‹#›</a:t>
             </a:fld>
             <a:endParaRPr lang="en-GB" sz="1400">
               <a:solidFill>
@@ -19192,7 +18945,7 @@
   <p:clrMapOvr>
     <a:masterClrMapping/>
   </p:clrMapOvr>
-  <p:transition/>
+  <p:transition xmlns:p14="http://schemas.microsoft.com/office/powerpoint/2010/main"/>
 </p:sldLayout>
 </file>
 
@@ -19311,7 +19064,7 @@
                   <a:tab pos="9144000" algn="l"/>
                 </a:tabLst>
               </a:pPr>
-              <a:t>‹nº›</a:t>
+              <a:t>‹#›</a:t>
             </a:fld>
             <a:endParaRPr lang="en-GB" sz="1400">
               <a:solidFill>
@@ -19607,7 +19360,7 @@
   <p:clrMapOvr>
     <a:masterClrMapping/>
   </p:clrMapOvr>
-  <p:transition/>
+  <p:transition xmlns:p14="http://schemas.microsoft.com/office/powerpoint/2010/main"/>
 </p:sldLayout>
 </file>
 
@@ -19726,7 +19479,7 @@
                   <a:tab pos="9144000" algn="l"/>
                 </a:tabLst>
               </a:pPr>
-              <a:t>‹nº›</a:t>
+              <a:t>‹#›</a:t>
             </a:fld>
             <a:endParaRPr lang="en-GB" sz="1400">
               <a:solidFill>
@@ -20022,7 +19775,7 @@
   <p:clrMapOvr>
     <a:masterClrMapping/>
   </p:clrMapOvr>
-  <p:transition/>
+  <p:transition xmlns:p14="http://schemas.microsoft.com/office/powerpoint/2010/main"/>
 </p:sldLayout>
 </file>
 
@@ -20141,7 +19894,7 @@
                   <a:tab pos="9144000" algn="l"/>
                 </a:tabLst>
               </a:pPr>
-              <a:t>‹nº›</a:t>
+              <a:t>‹#›</a:t>
             </a:fld>
             <a:endParaRPr lang="en-GB" sz="1400">
               <a:solidFill>
@@ -20437,7 +20190,7 @@
   <p:clrMapOvr>
     <a:masterClrMapping/>
   </p:clrMapOvr>
-  <p:transition/>
+  <p:transition xmlns:p14="http://schemas.microsoft.com/office/powerpoint/2010/main"/>
 </p:sldLayout>
 </file>
 
@@ -21532,7 +21285,7 @@
                   <a:tab pos="9144000" algn="l"/>
                 </a:tabLst>
               </a:pPr>
-              <a:t>‹nº›</a:t>
+              <a:t>‹#›</a:t>
             </a:fld>
             <a:endParaRPr lang="en-GB" sz="1400">
               <a:solidFill>
@@ -23131,13 +22884,13 @@
   <p:clrMapOvr>
     <a:masterClrMapping/>
   </p:clrMapOvr>
-  <p:transition spd="med">
+  <p:transition xmlns:p14="http://schemas.microsoft.com/office/powerpoint/2010/main" spd="med">
     <p:wipe dir="r"/>
   </p:transition>
   <p:timing>
     <p:tnLst>
       <p:par>
-        <p:cTn id="1" dur="indefinite" restart="never" nodeType="tmRoot">
+        <p:cTn xmlns:p14="http://schemas.microsoft.com/office/powerpoint/2010/main" id="1" dur="indefinite" restart="never" nodeType="tmRoot">
           <p:childTnLst>
             <p:seq concurrent="1" nextAc="seek">
               <p:cTn id="2" dur="indefinite" nodeType="mainSeq"/>
@@ -23664,13 +23417,13 @@
   <p:clrMapOvr>
     <a:masterClrMapping/>
   </p:clrMapOvr>
-  <p:transition spd="med">
+  <p:transition xmlns:p14="http://schemas.microsoft.com/office/powerpoint/2010/main" spd="med">
     <p:wipe dir="r"/>
   </p:transition>
   <p:timing>
     <p:tnLst>
       <p:par>
-        <p:cTn id="1" dur="indefinite" restart="never" nodeType="tmRoot">
+        <p:cTn xmlns:p14="http://schemas.microsoft.com/office/powerpoint/2010/main" id="1" dur="indefinite" restart="never" nodeType="tmRoot">
           <p:childTnLst>
             <p:seq concurrent="1" nextAc="seek">
               <p:cTn id="2" dur="indefinite" nodeType="mainSeq"/>
@@ -24205,13 +23958,13 @@
   <p:clrMapOvr>
     <a:masterClrMapping/>
   </p:clrMapOvr>
-  <p:transition spd="med">
+  <p:transition xmlns:p14="http://schemas.microsoft.com/office/powerpoint/2010/main" spd="med">
     <p:wipe dir="r"/>
   </p:transition>
   <p:timing>
     <p:tnLst>
       <p:par>
-        <p:cTn id="1" dur="indefinite" restart="never" nodeType="tmRoot">
+        <p:cTn xmlns:p14="http://schemas.microsoft.com/office/powerpoint/2010/main" id="1" dur="indefinite" restart="never" nodeType="tmRoot">
           <p:childTnLst>
             <p:seq concurrent="1" nextAc="seek">
               <p:cTn id="2" dur="indefinite" nodeType="mainSeq"/>
@@ -24448,13 +24201,13 @@
   <p:clrMapOvr>
     <a:masterClrMapping/>
   </p:clrMapOvr>
-  <p:transition spd="med">
+  <p:transition xmlns:p14="http://schemas.microsoft.com/office/powerpoint/2010/main" spd="med">
     <p:wipe dir="r"/>
   </p:transition>
   <p:timing>
     <p:tnLst>
       <p:par>
-        <p:cTn id="1" dur="indefinite" restart="never" nodeType="tmRoot">
+        <p:cTn xmlns:p14="http://schemas.microsoft.com/office/powerpoint/2010/main" id="1" dur="indefinite" restart="never" nodeType="tmRoot">
           <p:childTnLst>
             <p:seq concurrent="1" nextAc="seek">
               <p:cTn id="2" dur="indefinite" nodeType="mainSeq"/>
@@ -25772,13 +25525,13 @@
   <p:clrMapOvr>
     <a:masterClrMapping/>
   </p:clrMapOvr>
-  <p:transition spd="med">
+  <p:transition xmlns:p14="http://schemas.microsoft.com/office/powerpoint/2010/main" spd="med">
     <p:wipe dir="r"/>
   </p:transition>
   <p:timing>
     <p:tnLst>
       <p:par>
-        <p:cTn id="1" dur="indefinite" restart="never" nodeType="tmRoot">
+        <p:cTn xmlns:p14="http://schemas.microsoft.com/office/powerpoint/2010/main" id="1" dur="indefinite" restart="never" nodeType="tmRoot">
           <p:childTnLst>
             <p:seq concurrent="1" nextAc="seek">
               <p:cTn id="2" dur="indefinite" nodeType="mainSeq"/>
@@ -26746,13 +26499,13 @@
   <p:clrMapOvr>
     <a:masterClrMapping/>
   </p:clrMapOvr>
-  <p:transition spd="med">
+  <p:transition xmlns:p14="http://schemas.microsoft.com/office/powerpoint/2010/main" spd="med">
     <p:wipe dir="r"/>
   </p:transition>
   <p:timing>
     <p:tnLst>
       <p:par>
-        <p:cTn id="1" dur="indefinite" restart="never" nodeType="tmRoot">
+        <p:cTn xmlns:p14="http://schemas.microsoft.com/office/powerpoint/2010/main" id="1" dur="indefinite" restart="never" nodeType="tmRoot">
           <p:childTnLst>
             <p:seq concurrent="1" nextAc="seek">
               <p:cTn id="2" dur="indefinite" nodeType="mainSeq"/>
@@ -28134,13 +27887,13 @@
   <p:clrMapOvr>
     <a:masterClrMapping/>
   </p:clrMapOvr>
-  <p:transition spd="med">
+  <p:transition xmlns:p14="http://schemas.microsoft.com/office/powerpoint/2010/main" spd="med">
     <p:wipe dir="r"/>
   </p:transition>
   <p:timing>
     <p:tnLst>
       <p:par>
-        <p:cTn id="1" dur="indefinite" restart="never" nodeType="tmRoot">
+        <p:cTn xmlns:p14="http://schemas.microsoft.com/office/powerpoint/2010/main" id="1" dur="indefinite" restart="never" nodeType="tmRoot">
           <p:childTnLst>
             <p:seq concurrent="1" nextAc="seek">
               <p:cTn id="2" dur="indefinite" nodeType="mainSeq"/>
@@ -28377,13 +28130,13 @@
   <p:clrMapOvr>
     <a:masterClrMapping/>
   </p:clrMapOvr>
-  <p:transition spd="med">
+  <p:transition xmlns:p14="http://schemas.microsoft.com/office/powerpoint/2010/main" spd="med">
     <p:wipe dir="r"/>
   </p:transition>
   <p:timing>
     <p:tnLst>
       <p:par>
-        <p:cTn id="1" dur="indefinite" restart="never" nodeType="tmRoot">
+        <p:cTn xmlns:p14="http://schemas.microsoft.com/office/powerpoint/2010/main" id="1" dur="indefinite" restart="never" nodeType="tmRoot">
           <p:childTnLst>
             <p:seq concurrent="1" nextAc="seek">
               <p:cTn id="2" dur="indefinite" nodeType="mainSeq"/>
@@ -28609,7 +28362,7 @@
   <p:timing>
     <p:tnLst>
       <p:par>
-        <p:cTn id="1" dur="indefinite" restart="never" nodeType="tmRoot"/>
+        <p:cTn xmlns:p14="http://schemas.microsoft.com/office/powerpoint/2010/main" id="1" dur="indefinite" restart="never" nodeType="tmRoot"/>
       </p:par>
     </p:tnLst>
   </p:timing>
@@ -28730,14 +28483,14 @@
             <a:noFill/>
           </a:ln>
           <a:extLst>
-            <a:ext uri="{909E8E84-426E-40DD-AFC4-6F175D3DCCD1}">
+            <a:ext uri="{909E8E84-426E-40dd-AFC4-6F175D3DCCD1}">
               <a14:hiddenFill xmlns:a14="http://schemas.microsoft.com/office/drawing/2010/main">
                 <a:solidFill>
                   <a:srgbClr val="FFFFFF"/>
                 </a:solidFill>
               </a14:hiddenFill>
             </a:ext>
-            <a:ext uri="{91240B29-F687-4F45-9708-019B960494DF}">
+            <a:ext uri="{91240B29-F687-4f45-9708-019B960494DF}">
               <a14:hiddenLine xmlns:a14="http://schemas.microsoft.com/office/drawing/2010/main" w="9525">
                 <a:solidFill>
                   <a:srgbClr val="000000"/>
@@ -29043,55 +28796,71 @@
               <a:buNone/>
             </a:pPr>
             <a:r>
-              <a:rPr lang="en-US" sz="3200" dirty="0" smtClean="0">
-                <a:latin typeface="Tahoma" pitchFamily="-109" charset="0"/>
-                <a:ea typeface="ＭＳ Ｐゴシック" pitchFamily="-109" charset="-128"/>
-                <a:cs typeface="Tahoma" pitchFamily="-109" charset="0"/>
-              </a:rPr>
-              <a:t>Four kinds of relationship</a:t>
-            </a:r>
-          </a:p>
-          <a:p>
-            <a:pPr lvl="1"/>
-            <a:r>
               <a:rPr lang="en-US" sz="2800" dirty="0" smtClean="0">
                 <a:latin typeface="Tahoma" pitchFamily="-109" charset="0"/>
                 <a:ea typeface="ＭＳ Ｐゴシック" pitchFamily="-109" charset="-128"/>
                 <a:cs typeface="Tahoma" pitchFamily="-109" charset="0"/>
               </a:rPr>
-              <a:t>Hierarchic: the default one</a:t>
+              <a:t>Four kinds of relationship</a:t>
             </a:r>
           </a:p>
           <a:p>
             <a:pPr lvl="1"/>
             <a:r>
-              <a:rPr lang="en-US" sz="2800" dirty="0" smtClean="0">
+              <a:rPr lang="en-US" sz="2400" dirty="0" smtClean="0">
                 <a:latin typeface="Tahoma" pitchFamily="-109" charset="0"/>
                 <a:ea typeface="ＭＳ Ｐゴシック" pitchFamily="-109" charset="-128"/>
                 <a:cs typeface="Tahoma" pitchFamily="-109" charset="0"/>
               </a:rPr>
-              <a:t>Reference and path provides support for JCR references</a:t>
+              <a:t>Hierarchic: the default one</a:t>
             </a:r>
           </a:p>
           <a:p>
             <a:pPr lvl="1"/>
             <a:r>
-              <a:rPr lang="en-US" sz="2800" dirty="0" smtClean="0">
+              <a:rPr lang="en-US" sz="2400" dirty="0" smtClean="0">
                 <a:latin typeface="Tahoma" pitchFamily="-109" charset="0"/>
                 <a:ea typeface="ＭＳ Ｐゴシック" pitchFamily="-109" charset="-128"/>
                 <a:cs typeface="Tahoma" pitchFamily="-109" charset="0"/>
               </a:rPr>
-              <a:t>Embedded enable mapping for super type and </a:t>
-            </a:r>
-            <a:r>
-              <a:rPr lang="en-US" sz="2800" dirty="0" err="1" smtClean="0">
+              <a:t>Reference and path provides support for JCR references</a:t>
+            </a:r>
+          </a:p>
+          <a:p>
+            <a:pPr lvl="1"/>
+            <a:r>
+              <a:rPr lang="en-US" sz="2400" dirty="0" smtClean="0">
                 <a:latin typeface="Tahoma" pitchFamily="-109" charset="0"/>
                 <a:ea typeface="ＭＳ Ｐゴシック" pitchFamily="-109" charset="-128"/>
                 <a:cs typeface="Tahoma" pitchFamily="-109" charset="0"/>
               </a:rPr>
+              <a:t>Embedded </a:t>
+            </a:r>
+            <a:r>
+              <a:rPr lang="en-US" sz="2400" dirty="0" smtClean="0">
+                <a:latin typeface="Tahoma" pitchFamily="-109" charset="0"/>
+                <a:ea typeface="ＭＳ Ｐゴシック" pitchFamily="-109" charset="-128"/>
+                <a:cs typeface="Tahoma" pitchFamily="-109" charset="0"/>
+              </a:rPr>
+              <a:t>enables </a:t>
+            </a:r>
+            <a:r>
+              <a:rPr lang="en-US" sz="2400" dirty="0" smtClean="0">
+                <a:latin typeface="Tahoma" pitchFamily="-109" charset="0"/>
+                <a:ea typeface="ＭＳ Ｐゴシック" pitchFamily="-109" charset="-128"/>
+                <a:cs typeface="Tahoma" pitchFamily="-109" charset="0"/>
+              </a:rPr>
+              <a:t>mapping for super type and </a:t>
+            </a:r>
+            <a:r>
+              <a:rPr lang="en-US" sz="2400" dirty="0" err="1" smtClean="0">
+                <a:latin typeface="Tahoma" pitchFamily="-109" charset="0"/>
+                <a:ea typeface="ＭＳ Ｐゴシック" pitchFamily="-109" charset="-128"/>
+                <a:cs typeface="Tahoma" pitchFamily="-109" charset="0"/>
+              </a:rPr>
               <a:t>mixin</a:t>
             </a:r>
-            <a:endParaRPr lang="en-US" sz="2800" dirty="0" smtClean="0">
+            <a:endParaRPr lang="en-US" sz="2400" dirty="0" smtClean="0">
               <a:latin typeface="Tahoma" pitchFamily="-109" charset="0"/>
               <a:ea typeface="ＭＳ Ｐゴシック" pitchFamily="-109" charset="-128"/>
               <a:cs typeface="Tahoma" pitchFamily="-109" charset="0"/>
@@ -29099,7 +28868,7 @@
           </a:p>
           <a:p>
             <a:pPr lvl="2"/>
-            <a:endParaRPr lang="en-US" dirty="0" smtClean="0">
+            <a:endParaRPr lang="en-US" sz="2000" dirty="0" smtClean="0">
               <a:latin typeface="Tahoma" pitchFamily="-109" charset="0"/>
               <a:ea typeface="ＭＳ Ｐゴシック" pitchFamily="-109" charset="-128"/>
               <a:cs typeface="Tahoma" pitchFamily="-109" charset="0"/>
@@ -29556,13 +29325,13 @@
   <p:clrMapOvr>
     <a:masterClrMapping/>
   </p:clrMapOvr>
-  <p:transition spd="med">
+  <p:transition xmlns:p14="http://schemas.microsoft.com/office/powerpoint/2010/main" spd="med">
     <p:wipe dir="r"/>
   </p:transition>
   <p:timing>
     <p:tnLst>
       <p:par>
-        <p:cTn id="1" dur="indefinite" restart="never" nodeType="tmRoot">
+        <p:cTn xmlns:p14="http://schemas.microsoft.com/office/powerpoint/2010/main" id="1" dur="indefinite" restart="never" nodeType="tmRoot">
           <p:childTnLst>
             <p:seq concurrent="1" nextAc="seek">
               <p:cTn id="2" dur="indefinite" nodeType="mainSeq"/>
@@ -30242,11 +30011,14 @@
           <a:lstStyle/>
           <a:p>
             <a:pPr>
+              <a:lnSpc>
+                <a:spcPct val="80000"/>
+              </a:lnSpc>
               <a:buFont typeface="Arial" charset="0"/>
               <a:buNone/>
             </a:pPr>
             <a:r>
-              <a:rPr lang="en-US" sz="2100">
+              <a:rPr lang="en-US" sz="2100" dirty="0">
                 <a:latin typeface="Monaco" pitchFamily="-109" charset="0"/>
                 <a:ea typeface="ＭＳ Ｐゴシック" pitchFamily="-109" charset="-128"/>
                 <a:cs typeface="Tahoma" pitchFamily="-109" charset="0"/>
@@ -30256,52 +30028,29 @@
           </a:p>
           <a:p>
             <a:pPr>
+              <a:lnSpc>
+                <a:spcPct val="80000"/>
+              </a:lnSpc>
               <a:buFont typeface="Arial" charset="0"/>
               <a:buNone/>
             </a:pPr>
             <a:r>
-              <a:rPr lang="en-US" sz="2100">
+              <a:rPr lang="en-US" sz="2100" dirty="0">
                 <a:latin typeface="Monaco" pitchFamily="-109" charset="0"/>
                 <a:ea typeface="ＭＳ Ｐゴシック" pitchFamily="-109" charset="-128"/>
                 <a:cs typeface="Tahoma" pitchFamily="-109" charset="0"/>
               </a:rPr>
-              <a:t>  @OneToMany</a:t>
-            </a:r>
-          </a:p>
-          <a:p>
-            <a:pPr>
-              <a:buFont typeface="Arial" charset="0"/>
-              <a:buNone/>
-            </a:pPr>
-            <a:r>
-              <a:rPr lang="en-US" sz="2100">
+              <a:t>  @</a:t>
+            </a:r>
+            <a:r>
+              <a:rPr lang="en-US" sz="2100" dirty="0" err="1">
                 <a:latin typeface="Monaco" pitchFamily="-109" charset="0"/>
                 <a:ea typeface="ＭＳ Ｐゴシック" pitchFamily="-109" charset="-128"/>
                 <a:cs typeface="Tahoma" pitchFamily="-109" charset="0"/>
               </a:rPr>
-              <a:t>  public abstract Collection&lt;T&gt; getChildren();</a:t>
-            </a:r>
-          </a:p>
-          <a:p>
-            <a:pPr>
-              <a:buFont typeface="Arial" charset="0"/>
-              <a:buNone/>
-            </a:pPr>
-            <a:r>
-              <a:rPr lang="en-US" sz="2100">
-                <a:latin typeface="Monaco" pitchFamily="-109" charset="0"/>
-                <a:ea typeface="ＭＳ Ｐゴシック" pitchFamily="-109" charset="-128"/>
-                <a:cs typeface="Tahoma" pitchFamily="-109" charset="0"/>
-              </a:rPr>
-              <a:t>}</a:t>
-            </a:r>
-          </a:p>
-          <a:p>
-            <a:pPr>
-              <a:buFont typeface="Arial" charset="0"/>
-              <a:buNone/>
-            </a:pPr>
-            <a:endParaRPr lang="en-US" sz="2100">
+              <a:t>OneToMany</a:t>
+            </a:r>
+            <a:endParaRPr lang="en-US" sz="2100" dirty="0">
               <a:latin typeface="Monaco" pitchFamily="-109" charset="0"/>
               <a:ea typeface="ＭＳ Ｐゴシック" pitchFamily="-109" charset="-128"/>
               <a:cs typeface="Tahoma" pitchFamily="-109" charset="0"/>
@@ -30309,52 +30058,63 @@
           </a:p>
           <a:p>
             <a:pPr>
+              <a:lnSpc>
+                <a:spcPct val="80000"/>
+              </a:lnSpc>
               <a:buFont typeface="Arial" charset="0"/>
               <a:buNone/>
             </a:pPr>
             <a:r>
-              <a:rPr lang="en-US" sz="2100">
+              <a:rPr lang="en-US" sz="2100" dirty="0">
                 <a:latin typeface="Monaco" pitchFamily="-109" charset="0"/>
                 <a:ea typeface="ＭＳ Ｐゴシック" pitchFamily="-109" charset="-128"/>
                 <a:cs typeface="Tahoma" pitchFamily="-109" charset="0"/>
               </a:rPr>
-              <a:t>@PrimaryType(name=“nt:folder”)</a:t>
+              <a:t>  public abstract Collection&lt;T&gt; </a:t>
+            </a:r>
+            <a:r>
+              <a:rPr lang="en-US" sz="2100" dirty="0" err="1">
+                <a:latin typeface="Monaco" pitchFamily="-109" charset="0"/>
+                <a:ea typeface="ＭＳ Ｐゴシック" pitchFamily="-109" charset="-128"/>
+                <a:cs typeface="Tahoma" pitchFamily="-109" charset="0"/>
+              </a:rPr>
+              <a:t>getChildren</a:t>
+            </a:r>
+            <a:r>
+              <a:rPr lang="en-US" sz="2100" dirty="0">
+                <a:latin typeface="Monaco" pitchFamily="-109" charset="0"/>
+                <a:ea typeface="ＭＳ Ｐゴシック" pitchFamily="-109" charset="-128"/>
+                <a:cs typeface="Tahoma" pitchFamily="-109" charset="0"/>
+              </a:rPr>
+              <a:t>();</a:t>
             </a:r>
           </a:p>
           <a:p>
             <a:pPr>
+              <a:lnSpc>
+                <a:spcPct val="80000"/>
+              </a:lnSpc>
               <a:buFont typeface="Arial" charset="0"/>
               <a:buNone/>
             </a:pPr>
             <a:r>
-              <a:rPr lang="en-US" sz="2100">
+              <a:rPr lang="en-US" sz="2100" dirty="0">
                 <a:latin typeface="Monaco" pitchFamily="-109" charset="0"/>
                 <a:ea typeface="ＭＳ Ｐゴシック" pitchFamily="-109" charset="-128"/>
                 <a:cs typeface="Tahoma" pitchFamily="-109" charset="0"/>
               </a:rPr>
-              <a:t>public abstract class Directory extends Container&lt;File&gt; {</a:t>
+              <a:t>}</a:t>
             </a:r>
           </a:p>
           <a:p>
             <a:pPr>
+              <a:lnSpc>
+                <a:spcPct val="80000"/>
+              </a:lnSpc>
               <a:buFont typeface="Arial" charset="0"/>
               <a:buNone/>
             </a:pPr>
-            <a:r>
-              <a:rPr lang="en-US" sz="2100">
-                <a:latin typeface="Monaco" pitchFamily="-109" charset="0"/>
-                <a:ea typeface="ＭＳ Ｐゴシック" pitchFamily="-109" charset="-128"/>
-                <a:cs typeface="Tahoma" pitchFamily="-109" charset="0"/>
-              </a:rPr>
-              <a:t>}</a:t>
-            </a:r>
-          </a:p>
-          <a:p>
-            <a:pPr>
-              <a:buFont typeface="Arial" charset="0"/>
-              <a:buNone/>
-            </a:pPr>
-            <a:endParaRPr lang="en-US" sz="2100">
+            <a:endParaRPr lang="en-US" sz="2100" dirty="0">
               <a:latin typeface="Monaco" pitchFamily="-109" charset="0"/>
               <a:ea typeface="ＭＳ Ｐゴシック" pitchFamily="-109" charset="-128"/>
               <a:cs typeface="Tahoma" pitchFamily="-109" charset="0"/>
@@ -30362,39 +30122,193 @@
           </a:p>
           <a:p>
             <a:pPr>
+              <a:lnSpc>
+                <a:spcPct val="80000"/>
+              </a:lnSpc>
               <a:buFont typeface="Arial" charset="0"/>
               <a:buNone/>
             </a:pPr>
             <a:r>
-              <a:rPr lang="en-US" sz="2100">
+              <a:rPr lang="en-US" sz="2100" dirty="0">
                 <a:latin typeface="Monaco" pitchFamily="-109" charset="0"/>
                 <a:ea typeface="ＭＳ Ｐゴシック" pitchFamily="-109" charset="-128"/>
                 <a:cs typeface="Tahoma" pitchFamily="-109" charset="0"/>
               </a:rPr>
-              <a:t>@PrimaryType(name=“identities”)</a:t>
+              <a:t>@</a:t>
+            </a:r>
+            <a:r>
+              <a:rPr lang="en-US" sz="2100" dirty="0" err="1">
+                <a:latin typeface="Monaco" pitchFamily="-109" charset="0"/>
+                <a:ea typeface="ＭＳ Ｐゴシック" pitchFamily="-109" charset="-128"/>
+                <a:cs typeface="Tahoma" pitchFamily="-109" charset="0"/>
+              </a:rPr>
+              <a:t>PrimaryType</a:t>
+            </a:r>
+            <a:r>
+              <a:rPr lang="en-US" sz="2100" dirty="0">
+                <a:latin typeface="Monaco" pitchFamily="-109" charset="0"/>
+                <a:ea typeface="ＭＳ Ｐゴシック" pitchFamily="-109" charset="-128"/>
+                <a:cs typeface="Tahoma" pitchFamily="-109" charset="0"/>
+              </a:rPr>
+              <a:t>(name=“</a:t>
+            </a:r>
+            <a:r>
+              <a:rPr lang="en-US" sz="2100" dirty="0" err="1">
+                <a:latin typeface="Monaco" pitchFamily="-109" charset="0"/>
+                <a:ea typeface="ＭＳ Ｐゴシック" pitchFamily="-109" charset="-128"/>
+                <a:cs typeface="Tahoma" pitchFamily="-109" charset="0"/>
+              </a:rPr>
+              <a:t>nt:folder</a:t>
+            </a:r>
+            <a:r>
+              <a:rPr lang="en-US" sz="2100" dirty="0">
+                <a:latin typeface="Monaco" pitchFamily="-109" charset="0"/>
+                <a:ea typeface="ＭＳ Ｐゴシック" pitchFamily="-109" charset="-128"/>
+                <a:cs typeface="Tahoma" pitchFamily="-109" charset="0"/>
+              </a:rPr>
+              <a:t>”)</a:t>
             </a:r>
           </a:p>
           <a:p>
             <a:pPr>
+              <a:lnSpc>
+                <a:spcPct val="80000"/>
+              </a:lnSpc>
               <a:buFont typeface="Arial" charset="0"/>
               <a:buNone/>
             </a:pPr>
             <a:r>
-              <a:rPr lang="en-US" sz="2100">
+              <a:rPr lang="en-US" sz="2100" dirty="0">
                 <a:latin typeface="Monaco" pitchFamily="-109" charset="0"/>
                 <a:ea typeface="ＭＳ Ｐゴシック" pitchFamily="-109" charset="-128"/>
                 <a:cs typeface="Tahoma" pitchFamily="-109" charset="0"/>
               </a:rPr>
-              <a:t>public abstract class IdentityContainer&lt;I extends IdentityObject&gt; extends Container&lt;I&gt; {</a:t>
+              <a:t>public abstract class Directory extends Container&lt;File&gt; {</a:t>
             </a:r>
           </a:p>
           <a:p>
             <a:pPr>
+              <a:lnSpc>
+                <a:spcPct val="80000"/>
+              </a:lnSpc>
               <a:buFont typeface="Arial" charset="0"/>
               <a:buNone/>
             </a:pPr>
             <a:r>
-              <a:rPr lang="en-US" sz="2100">
+              <a:rPr lang="en-US" sz="2100" dirty="0">
+                <a:latin typeface="Monaco" pitchFamily="-109" charset="0"/>
+                <a:ea typeface="ＭＳ Ｐゴシック" pitchFamily="-109" charset="-128"/>
+                <a:cs typeface="Tahoma" pitchFamily="-109" charset="0"/>
+              </a:rPr>
+              <a:t>}</a:t>
+            </a:r>
+          </a:p>
+          <a:p>
+            <a:pPr>
+              <a:lnSpc>
+                <a:spcPct val="80000"/>
+              </a:lnSpc>
+              <a:buFont typeface="Arial" charset="0"/>
+              <a:buNone/>
+            </a:pPr>
+            <a:endParaRPr lang="en-US" sz="2100" dirty="0">
+              <a:latin typeface="Monaco" pitchFamily="-109" charset="0"/>
+              <a:ea typeface="ＭＳ Ｐゴシック" pitchFamily="-109" charset="-128"/>
+              <a:cs typeface="Tahoma" pitchFamily="-109" charset="0"/>
+            </a:endParaRPr>
+          </a:p>
+          <a:p>
+            <a:pPr>
+              <a:lnSpc>
+                <a:spcPct val="80000"/>
+              </a:lnSpc>
+              <a:buFont typeface="Arial" charset="0"/>
+              <a:buNone/>
+            </a:pPr>
+            <a:r>
+              <a:rPr lang="en-US" sz="2100" dirty="0">
+                <a:latin typeface="Monaco" pitchFamily="-109" charset="0"/>
+                <a:ea typeface="ＭＳ Ｐゴシック" pitchFamily="-109" charset="-128"/>
+                <a:cs typeface="Tahoma" pitchFamily="-109" charset="0"/>
+              </a:rPr>
+              <a:t>@</a:t>
+            </a:r>
+            <a:r>
+              <a:rPr lang="en-US" sz="2100" dirty="0" err="1">
+                <a:latin typeface="Monaco" pitchFamily="-109" charset="0"/>
+                <a:ea typeface="ＭＳ Ｐゴシック" pitchFamily="-109" charset="-128"/>
+                <a:cs typeface="Tahoma" pitchFamily="-109" charset="0"/>
+              </a:rPr>
+              <a:t>PrimaryType</a:t>
+            </a:r>
+            <a:r>
+              <a:rPr lang="en-US" sz="2100" dirty="0">
+                <a:latin typeface="Monaco" pitchFamily="-109" charset="0"/>
+                <a:ea typeface="ＭＳ Ｐゴシック" pitchFamily="-109" charset="-128"/>
+                <a:cs typeface="Tahoma" pitchFamily="-109" charset="0"/>
+              </a:rPr>
+              <a:t>(name=“identities”)</a:t>
+            </a:r>
+          </a:p>
+          <a:p>
+            <a:pPr>
+              <a:lnSpc>
+                <a:spcPct val="80000"/>
+              </a:lnSpc>
+              <a:buFont typeface="Arial" charset="0"/>
+              <a:buNone/>
+            </a:pPr>
+            <a:r>
+              <a:rPr lang="en-US" sz="2100" dirty="0">
+                <a:latin typeface="Monaco" pitchFamily="-109" charset="0"/>
+                <a:ea typeface="ＭＳ Ｐゴシック" pitchFamily="-109" charset="-128"/>
+                <a:cs typeface="Tahoma" pitchFamily="-109" charset="0"/>
+              </a:rPr>
+              <a:t>public abstract class </a:t>
+            </a:r>
+            <a:r>
+              <a:rPr lang="en-US" sz="2100" dirty="0" err="1">
+                <a:latin typeface="Monaco" pitchFamily="-109" charset="0"/>
+                <a:ea typeface="ＭＳ Ｐゴシック" pitchFamily="-109" charset="-128"/>
+                <a:cs typeface="Tahoma" pitchFamily="-109" charset="0"/>
+              </a:rPr>
+              <a:t>IdentityContainer</a:t>
+            </a:r>
+            <a:r>
+              <a:rPr lang="en-US" sz="2100" dirty="0">
+                <a:latin typeface="Monaco" pitchFamily="-109" charset="0"/>
+                <a:ea typeface="ＭＳ Ｐゴシック" pitchFamily="-109" charset="-128"/>
+                <a:cs typeface="Tahoma" pitchFamily="-109" charset="0"/>
+              </a:rPr>
+              <a:t>&lt;I extends </a:t>
+            </a:r>
+            <a:r>
+              <a:rPr lang="en-US" sz="2100" dirty="0" err="1">
+                <a:latin typeface="Monaco" pitchFamily="-109" charset="0"/>
+                <a:ea typeface="ＭＳ Ｐゴシック" pitchFamily="-109" charset="-128"/>
+                <a:cs typeface="Tahoma" pitchFamily="-109" charset="0"/>
+              </a:rPr>
+              <a:t>IdentityObject</a:t>
+            </a:r>
+            <a:r>
+              <a:rPr lang="en-US" sz="2100" dirty="0">
+                <a:latin typeface="Monaco" pitchFamily="-109" charset="0"/>
+                <a:ea typeface="ＭＳ Ｐゴシック" pitchFamily="-109" charset="-128"/>
+                <a:cs typeface="Tahoma" pitchFamily="-109" charset="0"/>
+              </a:rPr>
+              <a:t>&gt; extends Container&lt;I&gt; {</a:t>
+            </a:r>
+          </a:p>
+          <a:p>
+            <a:pPr>
+              <a:lnSpc>
+                <a:spcPct val="80000"/>
+              </a:lnSpc>
+              <a:buFont typeface="Arial" charset="0"/>
+              <a:buNone/>
+            </a:pPr>
+            <a:r>
+              <a:rPr lang="en-US" sz="2100" dirty="0">
                 <a:latin typeface="Monaco" pitchFamily="-109" charset="0"/>
                 <a:ea typeface="ＭＳ Ｐゴシック" pitchFamily="-109" charset="-128"/>
                 <a:cs typeface="Tahoma" pitchFamily="-109" charset="0"/>
@@ -30487,7 +30401,7 @@
               <a:buNone/>
             </a:pPr>
             <a:r>
-              <a:rPr lang="en-US" sz="3200" dirty="0">
+              <a:rPr lang="en-US" sz="2400" dirty="0">
                 <a:latin typeface="Tahoma" pitchFamily="-109" charset="0"/>
                 <a:ea typeface="ＭＳ Ｐゴシック" pitchFamily="-109" charset="-128"/>
                 <a:cs typeface="Tahoma" pitchFamily="-109" charset="0"/>
@@ -30495,7 +30409,7 @@
               <a:t>The session provides </a:t>
             </a:r>
             <a:r>
-              <a:rPr lang="en-US" sz="3200" dirty="0" err="1">
+              <a:rPr lang="en-US" sz="2400" dirty="0" err="1">
                 <a:latin typeface="Tahoma" pitchFamily="-109" charset="0"/>
                 <a:ea typeface="ＭＳ Ｐゴシック" pitchFamily="-109" charset="-128"/>
                 <a:cs typeface="Tahoma" pitchFamily="-109" charset="0"/>
@@ -30503,7 +30417,7 @@
               <a:t>eventing</a:t>
             </a:r>
             <a:r>
-              <a:rPr lang="en-US" sz="3200" dirty="0">
+              <a:rPr lang="en-US" sz="2400" dirty="0">
                 <a:latin typeface="Tahoma" pitchFamily="-109" charset="0"/>
                 <a:ea typeface="ＭＳ Ｐゴシック" pitchFamily="-109" charset="-128"/>
                 <a:cs typeface="Tahoma" pitchFamily="-109" charset="0"/>
@@ -30518,7 +30432,7 @@
               </a:lnSpc>
             </a:pPr>
             <a:r>
-              <a:rPr lang="en-US" sz="2800" dirty="0">
+              <a:rPr lang="en-US" sz="2000" dirty="0">
                 <a:latin typeface="Tahoma" pitchFamily="-109" charset="0"/>
                 <a:ea typeface="ＭＳ Ｐゴシック" pitchFamily="-109" charset="-128"/>
                 <a:cs typeface="Tahoma" pitchFamily="-109" charset="0"/>
@@ -30533,7 +30447,7 @@
               </a:lnSpc>
             </a:pPr>
             <a:r>
-              <a:rPr lang="en-US" sz="2800" dirty="0">
+              <a:rPr lang="en-US" sz="2000" dirty="0">
                 <a:latin typeface="Tahoma" pitchFamily="-109" charset="0"/>
                 <a:ea typeface="ＭＳ Ｐゴシック" pitchFamily="-109" charset="-128"/>
                 <a:cs typeface="Tahoma" pitchFamily="-109" charset="0"/>
@@ -30549,7 +30463,7 @@
               <a:buNone/>
             </a:pPr>
             <a:r>
-              <a:rPr lang="en-US" sz="3200" dirty="0">
+              <a:rPr lang="en-US" sz="2400" dirty="0">
                 <a:latin typeface="Tahoma" pitchFamily="-109" charset="0"/>
                 <a:ea typeface="ＭＳ Ｐゴシック" pitchFamily="-109" charset="-128"/>
                 <a:cs typeface="Tahoma" pitchFamily="-109" charset="0"/>
@@ -30569,7 +30483,7 @@
         </p:nvSpPr>
         <p:spPr bwMode="auto">
           <a:xfrm>
-            <a:off x="558006" y="3715091"/>
+            <a:off x="558006" y="3347789"/>
             <a:ext cx="10044113" cy="3291608"/>
           </a:xfrm>
           <a:prstGeom prst="rect">
@@ -30580,14 +30494,14 @@
             <a:noFill/>
           </a:ln>
           <a:extLst>
-            <a:ext uri="{909E8E84-426E-40DD-AFC4-6F175D3DCCD1}">
+            <a:ext uri="{909E8E84-426E-40dd-AFC4-6F175D3DCCD1}">
               <a14:hiddenFill xmlns:a14="http://schemas.microsoft.com/office/drawing/2010/main">
                 <a:solidFill>
                   <a:srgbClr val="FFFFFF"/>
                 </a:solidFill>
               </a14:hiddenFill>
             </a:ext>
-            <a:ext uri="{91240B29-F687-4F45-9708-019B960494DF}">
+            <a:ext uri="{91240B29-F687-4f45-9708-019B960494DF}">
               <a14:hiddenLine xmlns:a14="http://schemas.microsoft.com/office/drawing/2010/main" w="9525">
                 <a:solidFill>
                   <a:srgbClr val="000000"/>
@@ -30710,6 +30624,9 @@
           </a:lstStyle>
           <a:p>
             <a:pPr>
+              <a:lnSpc>
+                <a:spcPct val="90000"/>
+              </a:lnSpc>
               <a:spcBef>
                 <a:spcPct val="20000"/>
               </a:spcBef>
@@ -30749,6 +30666,9 @@
           </a:p>
           <a:p>
             <a:pPr>
+              <a:lnSpc>
+                <a:spcPct val="90000"/>
+              </a:lnSpc>
               <a:spcBef>
                 <a:spcPct val="20000"/>
               </a:spcBef>
@@ -30761,6 +30681,9 @@
           </a:p>
           <a:p>
             <a:pPr>
+              <a:lnSpc>
+                <a:spcPct val="90000"/>
+              </a:lnSpc>
               <a:spcBef>
                 <a:spcPct val="20000"/>
               </a:spcBef>
@@ -30776,6 +30699,9 @@
           </a:p>
           <a:p>
             <a:pPr>
+              <a:lnSpc>
+                <a:spcPct val="90000"/>
+              </a:lnSpc>
               <a:spcBef>
                 <a:spcPct val="20000"/>
               </a:spcBef>
@@ -30815,6 +30741,9 @@
           </a:p>
           <a:p>
             <a:pPr>
+              <a:lnSpc>
+                <a:spcPct val="90000"/>
+              </a:lnSpc>
               <a:spcBef>
                 <a:spcPct val="20000"/>
               </a:spcBef>
@@ -30854,6 +30783,9 @@
           </a:p>
           <a:p>
             <a:pPr>
+              <a:lnSpc>
+                <a:spcPct val="90000"/>
+              </a:lnSpc>
               <a:spcBef>
                 <a:spcPct val="20000"/>
               </a:spcBef>
@@ -30869,6 +30801,9 @@
           </a:p>
           <a:p>
             <a:pPr>
+              <a:lnSpc>
+                <a:spcPct val="90000"/>
+              </a:lnSpc>
               <a:spcBef>
                 <a:spcPct val="20000"/>
               </a:spcBef>
@@ -30879,29 +30814,29 @@
               <a:rPr lang="en-US" sz="1900" b="1" dirty="0">
                 <a:latin typeface="Monaco" pitchFamily="-109" charset="0"/>
               </a:rPr>
-              <a:t>  }</a:t>
-            </a:r>
+              <a:t>  </a:t>
+            </a:r>
+            <a:r>
+              <a:rPr lang="en-US" sz="1900" b="1" dirty="0" smtClean="0">
+                <a:latin typeface="Monaco" pitchFamily="-109" charset="0"/>
+              </a:rPr>
+              <a:t>}</a:t>
+            </a:r>
+            <a:endParaRPr lang="en-US" sz="1900" b="1" dirty="0">
+              <a:latin typeface="Monaco" pitchFamily="-109" charset="0"/>
+            </a:endParaRPr>
           </a:p>
           <a:p>
             <a:pPr>
+              <a:lnSpc>
+                <a:spcPct val="90000"/>
+              </a:lnSpc>
               <a:spcBef>
                 <a:spcPct val="20000"/>
               </a:spcBef>
               <a:buFont typeface="Arial" charset="0"/>
               <a:buNone/>
             </a:pPr>
-            <a:endParaRPr lang="en-US" sz="1900" b="1" dirty="0">
-              <a:latin typeface="Monaco" pitchFamily="-109" charset="0"/>
-            </a:endParaRPr>
-          </a:p>
-          <a:p>
-            <a:pPr>
-              <a:spcBef>
-                <a:spcPct val="20000"/>
-              </a:spcBef>
-              <a:buFont typeface="Arial" charset="0"/>
-              <a:buNone/>
-            </a:pPr>
             <a:r>
               <a:rPr lang="en-US" sz="1900" b="1" dirty="0">
                 <a:latin typeface="Monaco" pitchFamily="-109" charset="0"/>
@@ -30911,6 +30846,9 @@
           </a:p>
           <a:p>
             <a:pPr>
+              <a:lnSpc>
+                <a:spcPct val="90000"/>
+              </a:lnSpc>
               <a:spcBef>
                 <a:spcPct val="20000"/>
               </a:spcBef>
@@ -31165,13 +31103,13 @@
   <p:clrMapOvr>
     <a:masterClrMapping/>
   </p:clrMapOvr>
-  <p:transition spd="med">
+  <p:transition xmlns:p14="http://schemas.microsoft.com/office/powerpoint/2010/main" spd="med">
     <p:wipe dir="r"/>
   </p:transition>
   <p:timing>
     <p:tnLst>
       <p:par>
-        <p:cTn id="1" dur="indefinite" restart="never" nodeType="tmRoot">
+        <p:cTn xmlns:p14="http://schemas.microsoft.com/office/powerpoint/2010/main" id="1" dur="indefinite" restart="never" nodeType="tmRoot">
           <p:childTnLst>
             <p:seq concurrent="1" nextAc="seek">
               <p:cTn id="2" dur="indefinite" nodeType="mainSeq"/>
@@ -31811,13 +31749,13 @@
   <p:clrMapOvr>
     <a:masterClrMapping/>
   </p:clrMapOvr>
-  <p:transition spd="med">
+  <p:transition xmlns:p14="http://schemas.microsoft.com/office/powerpoint/2010/main" spd="med">
     <p:wipe dir="r"/>
   </p:transition>
   <p:timing>
     <p:tnLst>
       <p:par>
-        <p:cTn id="1" dur="indefinite" restart="never" nodeType="tmRoot">
+        <p:cTn xmlns:p14="http://schemas.microsoft.com/office/powerpoint/2010/main" id="1" dur="indefinite" restart="never" nodeType="tmRoot">
           <p:childTnLst>
             <p:seq concurrent="1" nextAc="seek">
               <p:cTn id="2" dur="indefinite" nodeType="mainSeq"/>
@@ -32635,13 +32573,13 @@
   <p:clrMapOvr>
     <a:masterClrMapping/>
   </p:clrMapOvr>
-  <p:transition spd="med">
+  <p:transition xmlns:p14="http://schemas.microsoft.com/office/powerpoint/2010/main" spd="med">
     <p:wipe dir="r"/>
   </p:transition>
   <p:timing>
     <p:tnLst>
       <p:par>
-        <p:cTn id="1" dur="indefinite" restart="never" nodeType="tmRoot">
+        <p:cTn xmlns:p14="http://schemas.microsoft.com/office/powerpoint/2010/main" id="1" dur="indefinite" restart="never" nodeType="tmRoot">
           <p:childTnLst>
             <p:seq concurrent="1" nextAc="seek">
               <p:cTn id="2" dur="indefinite" nodeType="mainSeq"/>
@@ -33114,15 +33052,12 @@
               </a:rPr>
               <a:t>(); </a:t>
             </a:r>
-            <a:r>
-              <a:rPr lang="fr-FR" sz="2000" dirty="0" smtClean="0">
-                <a:solidFill>
-                  <a:srgbClr val="000000"/>
-                </a:solidFill>
-                <a:latin typeface="AdobePiStd"/>
-              </a:rPr>
-              <a:t>¶</a:t>
-            </a:r>
+            <a:endParaRPr lang="fr-FR" sz="2000" dirty="0" smtClean="0">
+              <a:solidFill>
+                <a:srgbClr val="000000"/>
+              </a:solidFill>
+              <a:latin typeface="AdobePiStd"/>
+            </a:endParaRPr>
           </a:p>
           <a:p>
             <a:pPr>
@@ -33516,13 +33451,13 @@
   <p:clrMapOvr>
     <a:masterClrMapping/>
   </p:clrMapOvr>
-  <p:transition spd="med">
+  <p:transition xmlns:p14="http://schemas.microsoft.com/office/powerpoint/2010/main" spd="med">
     <p:wipe dir="r"/>
   </p:transition>
   <p:timing>
     <p:tnLst>
       <p:par>
-        <p:cTn id="1" dur="indefinite" restart="never" nodeType="tmRoot">
+        <p:cTn xmlns:p14="http://schemas.microsoft.com/office/powerpoint/2010/main" id="1" dur="indefinite" restart="never" nodeType="tmRoot">
           <p:childTnLst>
             <p:seq concurrent="1" nextAc="seek">
               <p:cTn id="2" dur="indefinite" nodeType="mainSeq"/>
@@ -33846,7 +33781,62 @@
                   <a:srgbClr val="4C4C4C"/>
                 </a:solidFill>
               </a:rPr>
-              <a:t>Does not modify existing classes, but takes the existing classes and adds new classes.</a:t>
+              <a:t>Does not modify existing classes, but takes the existing classes and adds new classes</a:t>
+            </a:r>
+            <a:r>
+              <a:rPr lang="en-US" sz="2000" b="1" i="1" dirty="0" smtClean="0">
+                <a:solidFill>
+                  <a:srgbClr val="4C4C4C"/>
+                </a:solidFill>
+              </a:rPr>
+              <a:t>.</a:t>
+            </a:r>
+          </a:p>
+          <a:p>
+            <a:pPr marL="258763" indent="-255588" hangingPunct="1">
+              <a:lnSpc>
+                <a:spcPct val="101000"/>
+              </a:lnSpc>
+              <a:spcAft>
+                <a:spcPts val="1425"/>
+              </a:spcAft>
+              <a:buClr>
+                <a:srgbClr val="FFA300"/>
+              </a:buClr>
+              <a:buSzPct val="150000"/>
+              <a:buFont typeface="Segoe UI" pitchFamily="32" charset="0"/>
+              <a:buChar char="»"/>
+              <a:tabLst>
+                <a:tab pos="258763" algn="l"/>
+                <a:tab pos="715963" algn="l"/>
+                <a:tab pos="1173163" algn="l"/>
+                <a:tab pos="1630363" algn="l"/>
+                <a:tab pos="2087563" algn="l"/>
+                <a:tab pos="2544763" algn="l"/>
+                <a:tab pos="3001963" algn="l"/>
+                <a:tab pos="3459163" algn="l"/>
+                <a:tab pos="3916363" algn="l"/>
+                <a:tab pos="4373563" algn="l"/>
+                <a:tab pos="4830763" algn="l"/>
+                <a:tab pos="5287963" algn="l"/>
+                <a:tab pos="5745163" algn="l"/>
+                <a:tab pos="6202363" algn="l"/>
+                <a:tab pos="6659563" algn="l"/>
+                <a:tab pos="7116763" algn="l"/>
+                <a:tab pos="7573963" algn="l"/>
+                <a:tab pos="8031163" algn="l"/>
+                <a:tab pos="8488363" algn="l"/>
+                <a:tab pos="8945563" algn="l"/>
+                <a:tab pos="9402763" algn="l"/>
+              </a:tabLst>
+            </a:pPr>
+            <a:r>
+              <a:rPr lang="en-US" sz="2000" b="1" i="1" dirty="0" smtClean="0">
+                <a:solidFill>
+                  <a:srgbClr val="4C4C4C"/>
+                </a:solidFill>
+              </a:rPr>
+              <a:t>Maven dependency entry:</a:t>
             </a:r>
             <a:endParaRPr lang="en-GB" sz="2800" b="1" i="1" dirty="0" smtClean="0">
               <a:solidFill>
@@ -33987,7 +33977,7 @@
         </p:nvSpPr>
         <p:spPr>
           <a:xfrm>
-            <a:off x="1187574" y="4211885"/>
+            <a:off x="1187574" y="4442425"/>
             <a:ext cx="7393495" cy="1569660"/>
           </a:xfrm>
           <a:prstGeom prst="rect">
@@ -34238,13 +34228,13 @@
   <p:clrMapOvr>
     <a:masterClrMapping/>
   </p:clrMapOvr>
-  <p:transition spd="med">
+  <p:transition xmlns:p14="http://schemas.microsoft.com/office/powerpoint/2010/main" spd="med">
     <p:wipe dir="r"/>
   </p:transition>
   <p:timing>
     <p:tnLst>
       <p:par>
-        <p:cTn id="1" dur="indefinite" restart="never" nodeType="tmRoot">
+        <p:cTn xmlns:p14="http://schemas.microsoft.com/office/powerpoint/2010/main" id="1" dur="indefinite" restart="never" nodeType="tmRoot">
           <p:childTnLst>
             <p:seq concurrent="1" nextAc="seek">
               <p:cTn id="2" dur="indefinite" nodeType="mainSeq"/>
@@ -34988,13 +34978,13 @@
   <p:clrMapOvr>
     <a:masterClrMapping/>
   </p:clrMapOvr>
-  <p:transition spd="med">
+  <p:transition xmlns:p14="http://schemas.microsoft.com/office/powerpoint/2010/main" spd="med">
     <p:wipe dir="r"/>
   </p:transition>
   <p:timing>
     <p:tnLst>
       <p:par>
-        <p:cTn id="1" dur="indefinite" restart="never" nodeType="tmRoot">
+        <p:cTn xmlns:p14="http://schemas.microsoft.com/office/powerpoint/2010/main" id="1" dur="indefinite" restart="never" nodeType="tmRoot">
           <p:childTnLst>
             <p:seq concurrent="1" nextAc="seek">
               <p:cTn id="2" dur="indefinite" nodeType="mainSeq"/>
@@ -35239,13 +35229,13 @@
   <p:clrMapOvr>
     <a:masterClrMapping/>
   </p:clrMapOvr>
-  <p:transition spd="med">
+  <p:transition xmlns:p14="http://schemas.microsoft.com/office/powerpoint/2010/main" spd="med">
     <p:wipe dir="r"/>
   </p:transition>
   <p:timing>
     <p:tnLst>
       <p:par>
-        <p:cTn id="1" dur="indefinite" restart="never" nodeType="tmRoot">
+        <p:cTn xmlns:p14="http://schemas.microsoft.com/office/powerpoint/2010/main" id="1" dur="indefinite" restart="never" nodeType="tmRoot">
           <p:childTnLst>
             <p:seq concurrent="1" nextAc="seek">
               <p:cTn id="2" dur="indefinite" nodeType="mainSeq"/>
@@ -36536,13 +36526,13 @@
   <p:clrMapOvr>
     <a:masterClrMapping/>
   </p:clrMapOvr>
-  <p:transition spd="med">
+  <p:transition xmlns:p14="http://schemas.microsoft.com/office/powerpoint/2010/main" spd="med">
     <p:wipe dir="r"/>
   </p:transition>
   <p:timing>
     <p:tnLst>
       <p:par>
-        <p:cTn id="1" dur="indefinite" restart="never" nodeType="tmRoot">
+        <p:cTn xmlns:p14="http://schemas.microsoft.com/office/powerpoint/2010/main" id="1" dur="indefinite" restart="never" nodeType="tmRoot">
           <p:childTnLst>
             <p:seq concurrent="1" nextAc="seek">
               <p:cTn id="2" dur="indefinite" nodeType="mainSeq"/>
@@ -36588,450 +36578,6 @@
       </p:grpSpPr>
       <p:sp>
         <p:nvSpPr>
-          <p:cNvPr id="81922" name="Text Box 1"/>
-          <p:cNvSpPr txBox="1">
-            <a:spLocks noChangeArrowheads="1"/>
-          </p:cNvSpPr>
-          <p:nvPr/>
-        </p:nvSpPr>
-        <p:spPr bwMode="auto">
-          <a:xfrm>
-            <a:off x="8001000" y="6886575"/>
-            <a:ext cx="2598738" cy="520700"/>
-          </a:xfrm>
-          <a:prstGeom prst="rect">
-            <a:avLst/>
-          </a:prstGeom>
-          <a:noFill/>
-          <a:ln w="9525">
-            <a:noFill/>
-            <a:round/>
-            <a:headEnd/>
-            <a:tailEnd/>
-          </a:ln>
-        </p:spPr>
-        <p:txBody>
-          <a:bodyPr lIns="0" tIns="0" rIns="0" bIns="0"/>
-          <a:lstStyle/>
-          <a:p>
-            <a:pPr algn="r">
-              <a:lnSpc>
-                <a:spcPct val="98000"/>
-              </a:lnSpc>
-              <a:buFont typeface="Wingdings" charset="2"/>
-              <a:buNone/>
-              <a:tabLst>
-                <a:tab pos="0" algn="l"/>
-                <a:tab pos="457200" algn="l"/>
-                <a:tab pos="914400" algn="l"/>
-                <a:tab pos="1371600" algn="l"/>
-                <a:tab pos="1828800" algn="l"/>
-                <a:tab pos="2286000" algn="l"/>
-                <a:tab pos="2743200" algn="l"/>
-                <a:tab pos="3200400" algn="l"/>
-                <a:tab pos="3657600" algn="l"/>
-                <a:tab pos="4114800" algn="l"/>
-                <a:tab pos="4572000" algn="l"/>
-                <a:tab pos="5029200" algn="l"/>
-                <a:tab pos="5486400" algn="l"/>
-                <a:tab pos="5943600" algn="l"/>
-                <a:tab pos="6400800" algn="l"/>
-                <a:tab pos="6858000" algn="l"/>
-                <a:tab pos="7315200" algn="l"/>
-                <a:tab pos="7772400" algn="l"/>
-                <a:tab pos="8229600" algn="l"/>
-                <a:tab pos="8686800" algn="l"/>
-                <a:tab pos="9144000" algn="l"/>
-              </a:tabLst>
-            </a:pPr>
-            <a:fld id="{0602AF10-AAB4-4DCB-A100-E509F43F837D}" type="slidenum">
-              <a:rPr lang="en-GB" sz="1400">
-                <a:solidFill>
-                  <a:srgbClr val="000000"/>
-                </a:solidFill>
-                <a:latin typeface="Times New Roman" pitchFamily="18" charset="0"/>
-                <a:ea typeface="Arial Unicode MS" pitchFamily="34" charset="-128"/>
-                <a:cs typeface="Arial Unicode MS" pitchFamily="34" charset="-128"/>
-              </a:rPr>
-              <a:pPr algn="r">
-                <a:lnSpc>
-                  <a:spcPct val="98000"/>
-                </a:lnSpc>
-                <a:buFont typeface="Wingdings" charset="2"/>
-                <a:buNone/>
-                <a:tabLst>
-                  <a:tab pos="0" algn="l"/>
-                  <a:tab pos="457200" algn="l"/>
-                  <a:tab pos="914400" algn="l"/>
-                  <a:tab pos="1371600" algn="l"/>
-                  <a:tab pos="1828800" algn="l"/>
-                  <a:tab pos="2286000" algn="l"/>
-                  <a:tab pos="2743200" algn="l"/>
-                  <a:tab pos="3200400" algn="l"/>
-                  <a:tab pos="3657600" algn="l"/>
-                  <a:tab pos="4114800" algn="l"/>
-                  <a:tab pos="4572000" algn="l"/>
-                  <a:tab pos="5029200" algn="l"/>
-                  <a:tab pos="5486400" algn="l"/>
-                  <a:tab pos="5943600" algn="l"/>
-                  <a:tab pos="6400800" algn="l"/>
-                  <a:tab pos="6858000" algn="l"/>
-                  <a:tab pos="7315200" algn="l"/>
-                  <a:tab pos="7772400" algn="l"/>
-                  <a:tab pos="8229600" algn="l"/>
-                  <a:tab pos="8686800" algn="l"/>
-                  <a:tab pos="9144000" algn="l"/>
-                </a:tabLst>
-              </a:pPr>
-              <a:t>31</a:t>
-            </a:fld>
-            <a:endParaRPr lang="en-GB" sz="1400">
-              <a:solidFill>
-                <a:srgbClr val="000000"/>
-              </a:solidFill>
-              <a:latin typeface="Times New Roman" pitchFamily="18" charset="0"/>
-              <a:ea typeface="Arial Unicode MS" pitchFamily="34" charset="-128"/>
-              <a:cs typeface="Arial Unicode MS" pitchFamily="34" charset="-128"/>
-            </a:endParaRPr>
-          </a:p>
-        </p:txBody>
-      </p:sp>
-      <p:sp>
-        <p:nvSpPr>
-          <p:cNvPr id="81923" name="Text Box 2"/>
-          <p:cNvSpPr txBox="1">
-            <a:spLocks noChangeArrowheads="1"/>
-          </p:cNvSpPr>
-          <p:nvPr/>
-        </p:nvSpPr>
-        <p:spPr bwMode="auto">
-          <a:xfrm>
-            <a:off x="550863" y="4692650"/>
-            <a:ext cx="10044112" cy="1492250"/>
-          </a:xfrm>
-          <a:prstGeom prst="rect">
-            <a:avLst/>
-          </a:prstGeom>
-          <a:noFill/>
-          <a:ln w="9525">
-            <a:noFill/>
-            <a:round/>
-            <a:headEnd/>
-            <a:tailEnd/>
-          </a:ln>
-        </p:spPr>
-        <p:txBody>
-          <a:bodyPr lIns="0" tIns="0" rIns="0" bIns="0" anchor="ctr"/>
-          <a:lstStyle/>
-          <a:p>
-            <a:pPr algn="ctr">
-              <a:lnSpc>
-                <a:spcPct val="96000"/>
-              </a:lnSpc>
-              <a:tabLst>
-                <a:tab pos="0" algn="l"/>
-                <a:tab pos="457200" algn="l"/>
-                <a:tab pos="914400" algn="l"/>
-                <a:tab pos="1371600" algn="l"/>
-                <a:tab pos="1828800" algn="l"/>
-                <a:tab pos="2286000" algn="l"/>
-                <a:tab pos="2743200" algn="l"/>
-                <a:tab pos="3200400" algn="l"/>
-                <a:tab pos="3657600" algn="l"/>
-                <a:tab pos="4114800" algn="l"/>
-                <a:tab pos="4572000" algn="l"/>
-                <a:tab pos="5029200" algn="l"/>
-                <a:tab pos="5486400" algn="l"/>
-                <a:tab pos="5943600" algn="l"/>
-                <a:tab pos="6400800" algn="l"/>
-                <a:tab pos="6858000" algn="l"/>
-                <a:tab pos="7315200" algn="l"/>
-                <a:tab pos="7772400" algn="l"/>
-                <a:tab pos="8229600" algn="l"/>
-                <a:tab pos="8686800" algn="l"/>
-                <a:tab pos="9144000" algn="l"/>
-                <a:tab pos="9410700" algn="l"/>
-              </a:tabLst>
-            </a:pPr>
-            <a:r>
-              <a:rPr lang="en-GB" sz="4800" dirty="0" smtClean="0">
-                <a:solidFill>
-                  <a:srgbClr val="FFFFFF"/>
-                </a:solidFill>
-              </a:rPr>
-              <a:t>Roadmap</a:t>
-            </a:r>
-            <a:endParaRPr lang="en-GB" sz="4800" dirty="0">
-              <a:solidFill>
-                <a:srgbClr val="FFFFFF"/>
-              </a:solidFill>
-            </a:endParaRPr>
-          </a:p>
-        </p:txBody>
-      </p:sp>
-    </p:spTree>
-    <p:extLst>
-      <p:ext uri="{BB962C8B-B14F-4D97-AF65-F5344CB8AC3E}">
-        <p14:creationId xmlns:p14="http://schemas.microsoft.com/office/powerpoint/2010/main" val="4076333860"/>
-      </p:ext>
-    </p:extLst>
-  </p:cSld>
-  <p:clrMapOvr>
-    <a:masterClrMapping/>
-  </p:clrMapOvr>
-  <p:transition spd="med">
-    <p:wipe dir="r"/>
-  </p:transition>
-  <p:timing>
-    <p:tnLst>
-      <p:par>
-        <p:cTn id="1" dur="indefinite" restart="never" nodeType="tmRoot">
-          <p:childTnLst>
-            <p:seq concurrent="1" nextAc="seek">
-              <p:cTn id="2" dur="indefinite" nodeType="mainSeq"/>
-              <p:prevCondLst>
-                <p:cond evt="onPrev" delay="0">
-                  <p:tgtEl>
-                    <p:sldTgt/>
-                  </p:tgtEl>
-                </p:cond>
-              </p:prevCondLst>
-              <p:nextCondLst>
-                <p:cond evt="onNext" delay="0">
-                  <p:tgtEl>
-                    <p:sldTgt/>
-                  </p:tgtEl>
-                </p:cond>
-              </p:nextCondLst>
-            </p:seq>
-          </p:childTnLst>
-        </p:cTn>
-      </p:par>
-    </p:tnLst>
-  </p:timing>
-</p:sld>
-</file>
-
-<file path=ppt/slides/slide32.xml><?xml version="1.0" encoding="utf-8"?>
-<p:sld xmlns:a="http://schemas.openxmlformats.org/drawingml/2006/main" xmlns:r="http://schemas.openxmlformats.org/officeDocument/2006/relationships" xmlns:p="http://schemas.openxmlformats.org/presentationml/2006/main">
-  <p:cSld>
-    <p:spTree>
-      <p:nvGrpSpPr>
-        <p:cNvPr id="1" name=""/>
-        <p:cNvGrpSpPr/>
-        <p:nvPr/>
-      </p:nvGrpSpPr>
-      <p:grpSpPr>
-        <a:xfrm>
-          <a:off x="0" y="0"/>
-          <a:ext cx="0" cy="0"/>
-          <a:chOff x="0" y="0"/>
-          <a:chExt cx="0" cy="0"/>
-        </a:xfrm>
-      </p:grpSpPr>
-      <p:sp>
-        <p:nvSpPr>
-          <p:cNvPr id="39938" name="Titre 1"/>
-          <p:cNvSpPr>
-            <a:spLocks noGrp="1"/>
-          </p:cNvSpPr>
-          <p:nvPr>
-            <p:ph type="title"/>
-          </p:nvPr>
-        </p:nvSpPr>
-        <p:spPr/>
-        <p:txBody>
-          <a:bodyPr/>
-          <a:lstStyle/>
-          <a:p>
-            <a:r>
-              <a:rPr lang="en-US" smtClean="0">
-                <a:latin typeface="Tahoma" pitchFamily="-109" charset="0"/>
-                <a:ea typeface="ＭＳ Ｐゴシック" pitchFamily="-109" charset="-128"/>
-                <a:cs typeface="Tahoma" pitchFamily="-109" charset="0"/>
-              </a:rPr>
-              <a:t>Roadmap</a:t>
-            </a:r>
-          </a:p>
-        </p:txBody>
-      </p:sp>
-      <p:sp>
-        <p:nvSpPr>
-          <p:cNvPr id="39939" name="Espace réservé du contenu 2"/>
-          <p:cNvSpPr>
-            <a:spLocks noGrp="1"/>
-          </p:cNvSpPr>
-          <p:nvPr>
-            <p:ph idx="1"/>
-          </p:nvPr>
-        </p:nvSpPr>
-        <p:spPr/>
-        <p:txBody>
-          <a:bodyPr/>
-          <a:lstStyle/>
-          <a:p>
-            <a:pPr>
-              <a:buFont typeface="Wingdings" pitchFamily="2" charset="2"/>
-              <a:buChar char="Ø"/>
-            </a:pPr>
-            <a:r>
-              <a:rPr lang="en-US" dirty="0" smtClean="0">
-                <a:latin typeface="Tahoma" pitchFamily="-109" charset="0"/>
-                <a:ea typeface="ＭＳ Ｐゴシック" pitchFamily="-109" charset="-128"/>
-                <a:cs typeface="Tahoma" pitchFamily="-109" charset="0"/>
-              </a:rPr>
-              <a:t>Detached/attached entities</a:t>
-            </a:r>
-          </a:p>
-          <a:p>
-            <a:pPr>
-              <a:buFont typeface="Wingdings" pitchFamily="2" charset="2"/>
-              <a:buChar char="Ø"/>
-            </a:pPr>
-            <a:r>
-              <a:rPr lang="en-US" dirty="0" smtClean="0">
-                <a:latin typeface="Tahoma" pitchFamily="-109" charset="0"/>
-                <a:ea typeface="ＭＳ Ｐゴシック" pitchFamily="-109" charset="-128"/>
-                <a:cs typeface="Tahoma" pitchFamily="-109" charset="0"/>
-              </a:rPr>
-              <a:t>Type safe query builder</a:t>
-            </a:r>
-          </a:p>
-          <a:p>
-            <a:pPr>
-              <a:buFont typeface="Wingdings" pitchFamily="2" charset="2"/>
-              <a:buChar char="Ø"/>
-            </a:pPr>
-            <a:r>
-              <a:rPr lang="en-US" dirty="0" smtClean="0">
-                <a:latin typeface="Tahoma" pitchFamily="-109" charset="0"/>
-                <a:ea typeface="ＭＳ Ｐゴシック" pitchFamily="-109" charset="-128"/>
-                <a:cs typeface="Tahoma" pitchFamily="-109" charset="0"/>
-              </a:rPr>
-              <a:t>Bean validation integration</a:t>
-            </a:r>
-          </a:p>
-          <a:p>
-            <a:pPr>
-              <a:buFont typeface="Wingdings" pitchFamily="2" charset="2"/>
-              <a:buChar char="Ø"/>
-            </a:pPr>
-            <a:r>
-              <a:rPr lang="en-US" dirty="0" smtClean="0">
-                <a:latin typeface="Tahoma" pitchFamily="-109" charset="0"/>
-                <a:ea typeface="ＭＳ Ｐゴシック" pitchFamily="-109" charset="-128"/>
-                <a:cs typeface="Tahoma" pitchFamily="-109" charset="0"/>
-              </a:rPr>
-              <a:t>Object versioning</a:t>
-            </a:r>
-          </a:p>
-          <a:p>
-            <a:pPr>
-              <a:buFont typeface="Wingdings" pitchFamily="2" charset="2"/>
-              <a:buChar char="Ø"/>
-            </a:pPr>
-            <a:r>
-              <a:rPr lang="en-US" dirty="0" smtClean="0">
-                <a:latin typeface="Tahoma" pitchFamily="-109" charset="0"/>
-                <a:ea typeface="ＭＳ Ｐゴシック" pitchFamily="-109" charset="-128"/>
-                <a:cs typeface="Tahoma" pitchFamily="-109" charset="0"/>
-              </a:rPr>
-              <a:t>Property map filtering</a:t>
-            </a:r>
-          </a:p>
-          <a:p>
-            <a:pPr marL="1074738" lvl="2" indent="0">
-              <a:buNone/>
-            </a:pPr>
-            <a:r>
-              <a:rPr lang="en-US" dirty="0" smtClean="0">
-                <a:latin typeface="Tahoma" pitchFamily="-109" charset="0"/>
-                <a:ea typeface="ＭＳ Ｐゴシック" pitchFamily="-109" charset="-128"/>
-                <a:cs typeface="Tahoma" pitchFamily="-109" charset="0"/>
-              </a:rPr>
-              <a:t>Map&lt;String, Integer&gt; </a:t>
-            </a:r>
-            <a:r>
-              <a:rPr lang="en-US" dirty="0" err="1" smtClean="0">
-                <a:latin typeface="Tahoma" pitchFamily="-109" charset="0"/>
-                <a:ea typeface="ＭＳ Ｐゴシック" pitchFamily="-109" charset="-128"/>
-                <a:cs typeface="Tahoma" pitchFamily="-109" charset="0"/>
-              </a:rPr>
-              <a:t>getIntProperties</a:t>
-            </a:r>
-            <a:r>
-              <a:rPr lang="en-US" dirty="0" smtClean="0">
-                <a:latin typeface="Tahoma" pitchFamily="-109" charset="0"/>
-                <a:ea typeface="ＭＳ Ｐゴシック" pitchFamily="-109" charset="-128"/>
-                <a:cs typeface="Tahoma" pitchFamily="-109" charset="0"/>
-              </a:rPr>
-              <a:t>();</a:t>
-            </a:r>
-          </a:p>
-          <a:p>
-            <a:pPr>
-              <a:buFont typeface="Wingdings" pitchFamily="2" charset="2"/>
-              <a:buChar char="Ø"/>
-            </a:pPr>
-            <a:r>
-              <a:rPr lang="en-US" dirty="0" smtClean="0">
-                <a:latin typeface="Tahoma" pitchFamily="-109" charset="0"/>
-                <a:ea typeface="ＭＳ Ｐゴシック" pitchFamily="-109" charset="-128"/>
-                <a:cs typeface="Tahoma" pitchFamily="-109" charset="0"/>
-              </a:rPr>
-              <a:t>More flexible </a:t>
-            </a:r>
-            <a:r>
-              <a:rPr lang="en-US" dirty="0" err="1" smtClean="0">
-                <a:latin typeface="Tahoma" pitchFamily="-109" charset="0"/>
-                <a:ea typeface="ＭＳ Ｐゴシック" pitchFamily="-109" charset="-128"/>
-                <a:cs typeface="Tahoma" pitchFamily="-109" charset="0"/>
-              </a:rPr>
-              <a:t>enum</a:t>
-            </a:r>
-            <a:r>
-              <a:rPr lang="en-US" dirty="0" smtClean="0">
-                <a:latin typeface="Tahoma" pitchFamily="-109" charset="0"/>
-                <a:ea typeface="ＭＳ Ｐゴシック" pitchFamily="-109" charset="-128"/>
-                <a:cs typeface="Tahoma" pitchFamily="-109" charset="0"/>
-              </a:rPr>
-              <a:t> mapping</a:t>
-            </a:r>
-          </a:p>
-        </p:txBody>
-      </p:sp>
-    </p:spTree>
-    <p:extLst>
-      <p:ext uri="{BB962C8B-B14F-4D97-AF65-F5344CB8AC3E}">
-        <p14:creationId xmlns:p14="http://schemas.microsoft.com/office/powerpoint/2010/main" val="1102284933"/>
-      </p:ext>
-    </p:extLst>
-  </p:cSld>
-  <p:clrMapOvr>
-    <a:masterClrMapping/>
-  </p:clrMapOvr>
-</p:sld>
-</file>
-
-<file path=ppt/slides/slide33.xml><?xml version="1.0" encoding="utf-8"?>
-<p:sld xmlns:a="http://schemas.openxmlformats.org/drawingml/2006/main" xmlns:r="http://schemas.openxmlformats.org/officeDocument/2006/relationships" xmlns:p="http://schemas.openxmlformats.org/presentationml/2006/main">
-  <p:cSld>
-    <p:spTree>
-      <p:nvGrpSpPr>
-        <p:cNvPr id="1" name=""/>
-        <p:cNvGrpSpPr/>
-        <p:nvPr/>
-      </p:nvGrpSpPr>
-      <p:grpSpPr>
-        <a:xfrm>
-          <a:off x="0" y="0"/>
-          <a:ext cx="0" cy="0"/>
-          <a:chOff x="0" y="0"/>
-          <a:chExt cx="0" cy="0"/>
-        </a:xfrm>
-      </p:grpSpPr>
-      <p:sp>
-        <p:nvSpPr>
           <p:cNvPr id="75778" name="Text Box 1"/>
           <p:cNvSpPr txBox="1">
             <a:spLocks noChangeArrowheads="1"/>
@@ -37108,13 +36654,13 @@
   <p:clrMapOvr>
     <a:masterClrMapping/>
   </p:clrMapOvr>
-  <p:transition spd="med">
+  <p:transition xmlns:p14="http://schemas.microsoft.com/office/powerpoint/2010/main" spd="med">
     <p:wipe dir="r"/>
   </p:transition>
   <p:timing>
     <p:tnLst>
       <p:par>
-        <p:cTn id="1" dur="indefinite" restart="never" nodeType="tmRoot">
+        <p:cTn xmlns:p14="http://schemas.microsoft.com/office/powerpoint/2010/main" id="1" dur="indefinite" restart="never" nodeType="tmRoot">
           <p:childTnLst>
             <p:seq concurrent="1" nextAc="seek">
               <p:cTn id="2" dur="indefinite" nodeType="mainSeq"/>
@@ -37333,14 +36879,14 @@
             <a:noFill/>
           </a:ln>
           <a:extLst>
-            <a:ext uri="{909E8E84-426E-40DD-AFC4-6F175D3DCCD1}">
+            <a:ext uri="{909E8E84-426E-40dd-AFC4-6F175D3DCCD1}">
               <a14:hiddenFill xmlns:a14="http://schemas.microsoft.com/office/drawing/2010/main">
                 <a:solidFill>
                   <a:srgbClr val="FFFFFF"/>
                 </a:solidFill>
               </a14:hiddenFill>
             </a:ext>
-            <a:ext uri="{91240B29-F687-4F45-9708-019B960494DF}">
+            <a:ext uri="{91240B29-F687-4f45-9708-019B960494DF}">
               <a14:hiddenLine xmlns:a14="http://schemas.microsoft.com/office/drawing/2010/main" w="9525">
                 <a:solidFill>
                   <a:srgbClr val="000000"/>
@@ -37363,13 +36909,13 @@
   <p:clrMapOvr>
     <a:masterClrMapping/>
   </p:clrMapOvr>
-  <p:transition spd="med">
+  <p:transition xmlns:p14="http://schemas.microsoft.com/office/powerpoint/2010/main" spd="med">
     <p:wipe dir="r"/>
   </p:transition>
   <p:timing>
     <p:tnLst>
       <p:par>
-        <p:cTn id="1" dur="indefinite" restart="never" nodeType="tmRoot">
+        <p:cTn xmlns:p14="http://schemas.microsoft.com/office/powerpoint/2010/main" id="1" dur="indefinite" restart="never" nodeType="tmRoot">
           <p:childTnLst>
             <p:seq concurrent="1" nextAc="seek">
               <p:cTn id="2" dur="indefinite" nodeType="mainSeq"/>
@@ -37913,13 +37459,13 @@
   <p:clrMapOvr>
     <a:masterClrMapping/>
   </p:clrMapOvr>
-  <p:transition spd="med">
+  <p:transition xmlns:p14="http://schemas.microsoft.com/office/powerpoint/2010/main" spd="med">
     <p:wipe dir="r"/>
   </p:transition>
   <p:timing>
     <p:tnLst>
       <p:par>
-        <p:cTn id="1" dur="indefinite" restart="never" nodeType="tmRoot">
+        <p:cTn xmlns:p14="http://schemas.microsoft.com/office/powerpoint/2010/main" id="1" dur="indefinite" restart="never" nodeType="tmRoot">
           <p:childTnLst>
             <p:seq concurrent="1" nextAc="seek">
               <p:cTn id="2" dur="indefinite" nodeType="mainSeq"/>
@@ -39804,13 +39350,13 @@
   <p:clrMapOvr>
     <a:masterClrMapping/>
   </p:clrMapOvr>
-  <p:transition spd="med">
+  <p:transition xmlns:p14="http://schemas.microsoft.com/office/powerpoint/2010/main" spd="med">
     <p:wipe dir="r"/>
   </p:transition>
   <p:timing>
     <p:tnLst>
       <p:par>
-        <p:cTn id="1" dur="indefinite" restart="never" nodeType="tmRoot">
+        <p:cTn xmlns:p14="http://schemas.microsoft.com/office/powerpoint/2010/main" id="1" dur="indefinite" restart="never" nodeType="tmRoot">
           <p:childTnLst>
             <p:seq concurrent="1" nextAc="seek">
               <p:cTn id="2" dur="indefinite" nodeType="mainSeq"/>
@@ -41211,13 +40757,13 @@
   <p:clrMapOvr>
     <a:masterClrMapping/>
   </p:clrMapOvr>
-  <p:transition spd="med">
+  <p:transition xmlns:p14="http://schemas.microsoft.com/office/powerpoint/2010/main" spd="med">
     <p:wipe dir="r"/>
   </p:transition>
   <p:timing>
     <p:tnLst>
       <p:par>
-        <p:cTn id="1" dur="indefinite" restart="never" nodeType="tmRoot">
+        <p:cTn xmlns:p14="http://schemas.microsoft.com/office/powerpoint/2010/main" id="1" dur="indefinite" restart="never" nodeType="tmRoot">
           <p:childTnLst>
             <p:seq concurrent="1" nextAc="seek">
               <p:cTn id="2" dur="indefinite" nodeType="mainSeq"/>
@@ -41931,13 +41477,13 @@
   <p:clrMapOvr>
     <a:masterClrMapping/>
   </p:clrMapOvr>
-  <p:transition spd="med">
+  <p:transition xmlns:p14="http://schemas.microsoft.com/office/powerpoint/2010/main" spd="med">
     <p:wipe dir="r"/>
   </p:transition>
   <p:timing>
     <p:tnLst>
       <p:par>
-        <p:cTn id="1" dur="indefinite" restart="never" nodeType="tmRoot">
+        <p:cTn xmlns:p14="http://schemas.microsoft.com/office/powerpoint/2010/main" id="1" dur="indefinite" restart="never" nodeType="tmRoot">
           <p:childTnLst>
             <p:seq concurrent="1" nextAc="seek">
               <p:cTn id="2" dur="indefinite" nodeType="mainSeq"/>
@@ -42174,13 +41720,13 @@
   <p:clrMapOvr>
     <a:masterClrMapping/>
   </p:clrMapOvr>
-  <p:transition spd="med">
+  <p:transition xmlns:p14="http://schemas.microsoft.com/office/powerpoint/2010/main" spd="med">
     <p:wipe dir="r"/>
   </p:transition>
   <p:timing>
     <p:tnLst>
       <p:par>
-        <p:cTn id="1" dur="indefinite" restart="never" nodeType="tmRoot">
+        <p:cTn xmlns:p14="http://schemas.microsoft.com/office/powerpoint/2010/main" id="1" dur="indefinite" restart="never" nodeType="tmRoot">
           <p:childTnLst>
             <p:seq concurrent="1" nextAc="seek">
               <p:cTn id="2" dur="indefinite" nodeType="mainSeq"/>

</xml_diff>